<commit_message>
unit 5 - plant physiology added
</commit_message>
<xml_diff>
--- a/neet/tamil_biology/files/unit_05_plant_physiology.pptx
+++ b/neet/tamil_biology/files/unit_05_plant_physiology.pptx
@@ -428,7 +428,7 @@
           <a:p>
             <a:fld id="{5BCAD085-E8A6-8845-BD4E-CB4CCA059FC4}" type="datetimeFigureOut">
               <a:rPr lang="en-US" smtClean="0"/>
-              <a:t>8/27/2020</a:t>
+              <a:t>8/28/2020</a:t>
             </a:fld>
             <a:endParaRPr lang="en-US"/>
           </a:p>
@@ -596,7 +596,7 @@
           <a:p>
             <a:fld id="{5BCAD085-E8A6-8845-BD4E-CB4CCA059FC4}" type="datetimeFigureOut">
               <a:rPr lang="en-US" smtClean="0"/>
-              <a:t>8/27/2020</a:t>
+              <a:t>8/28/2020</a:t>
             </a:fld>
             <a:endParaRPr lang="en-US"/>
           </a:p>
@@ -774,7 +774,7 @@
           <a:p>
             <a:fld id="{5BCAD085-E8A6-8845-BD4E-CB4CCA059FC4}" type="datetimeFigureOut">
               <a:rPr lang="en-US" smtClean="0"/>
-              <a:t>8/27/2020</a:t>
+              <a:t>8/28/2020</a:t>
             </a:fld>
             <a:endParaRPr lang="en-US"/>
           </a:p>
@@ -942,7 +942,7 @@
           <a:p>
             <a:fld id="{5BCAD085-E8A6-8845-BD4E-CB4CCA059FC4}" type="datetimeFigureOut">
               <a:rPr lang="en-US" smtClean="0"/>
-              <a:t>8/27/2020</a:t>
+              <a:t>8/28/2020</a:t>
             </a:fld>
             <a:endParaRPr lang="en-US"/>
           </a:p>
@@ -1187,7 +1187,7 @@
           <a:p>
             <a:fld id="{5BCAD085-E8A6-8845-BD4E-CB4CCA059FC4}" type="datetimeFigureOut">
               <a:rPr lang="en-US" smtClean="0"/>
-              <a:t>8/27/2020</a:t>
+              <a:t>8/28/2020</a:t>
             </a:fld>
             <a:endParaRPr lang="en-US"/>
           </a:p>
@@ -1472,7 +1472,7 @@
           <a:p>
             <a:fld id="{5BCAD085-E8A6-8845-BD4E-CB4CCA059FC4}" type="datetimeFigureOut">
               <a:rPr lang="en-US" smtClean="0"/>
-              <a:t>8/27/2020</a:t>
+              <a:t>8/28/2020</a:t>
             </a:fld>
             <a:endParaRPr lang="en-US"/>
           </a:p>
@@ -1891,7 +1891,7 @@
           <a:p>
             <a:fld id="{5BCAD085-E8A6-8845-BD4E-CB4CCA059FC4}" type="datetimeFigureOut">
               <a:rPr lang="en-US" smtClean="0"/>
-              <a:t>8/27/2020</a:t>
+              <a:t>8/28/2020</a:t>
             </a:fld>
             <a:endParaRPr lang="en-US"/>
           </a:p>
@@ -2008,7 +2008,7 @@
           <a:p>
             <a:fld id="{5BCAD085-E8A6-8845-BD4E-CB4CCA059FC4}" type="datetimeFigureOut">
               <a:rPr lang="en-US" smtClean="0"/>
-              <a:t>8/27/2020</a:t>
+              <a:t>8/28/2020</a:t>
             </a:fld>
             <a:endParaRPr lang="en-US"/>
           </a:p>
@@ -2103,7 +2103,7 @@
           <a:p>
             <a:fld id="{5BCAD085-E8A6-8845-BD4E-CB4CCA059FC4}" type="datetimeFigureOut">
               <a:rPr lang="en-US" smtClean="0"/>
-              <a:t>8/27/2020</a:t>
+              <a:t>8/28/2020</a:t>
             </a:fld>
             <a:endParaRPr lang="en-US"/>
           </a:p>
@@ -2378,7 +2378,7 @@
           <a:p>
             <a:fld id="{5BCAD085-E8A6-8845-BD4E-CB4CCA059FC4}" type="datetimeFigureOut">
               <a:rPr lang="en-US" smtClean="0"/>
-              <a:t>8/27/2020</a:t>
+              <a:t>8/28/2020</a:t>
             </a:fld>
             <a:endParaRPr lang="en-US"/>
           </a:p>
@@ -2630,7 +2630,7 @@
           <a:p>
             <a:fld id="{5BCAD085-E8A6-8845-BD4E-CB4CCA059FC4}" type="datetimeFigureOut">
               <a:rPr lang="en-US" smtClean="0"/>
-              <a:t>8/27/2020</a:t>
+              <a:t>8/28/2020</a:t>
             </a:fld>
             <a:endParaRPr lang="en-US"/>
           </a:p>
@@ -2841,7 +2841,7 @@
           <a:p>
             <a:fld id="{5BCAD085-E8A6-8845-BD4E-CB4CCA059FC4}" type="datetimeFigureOut">
               <a:rPr lang="en-US" smtClean="0"/>
-              <a:t>8/27/2020</a:t>
+              <a:t>8/28/2020</a:t>
             </a:fld>
             <a:endParaRPr lang="en-US"/>
           </a:p>
@@ -3342,7 +3342,7 @@
         </p:nvSpPr>
         <p:spPr>
           <a:xfrm>
-            <a:off x="457200" y="1371600"/>
+            <a:off x="457200" y="783772"/>
             <a:ext cx="7315200" cy="3657600"/>
           </a:xfrm>
           <a:prstGeom prst="rect">
@@ -3356,7 +3356,7 @@
           </a:bodyPr>
           <a:lstStyle/>
           <a:p>
-            <a:endParaRPr/>
+            <a:endParaRPr dirty="0"/>
           </a:p>
           <a:p>
             <a:pPr>
@@ -3368,48 +3368,397 @@
               </a:defRPr>
             </a:pPr>
             <a:r>
-              <a:t>Q - 5  A' மற்றும் 'B' ஆகிய இரு சவ்வூடுபரவல் அமைப்பு ஒரு அரைக்கடத்தி சவ்வினால் பிரிக்கப்படுள்ளது. அறை 'A'வின் சவ்வூடுபரவல் திறன் -30 வளி மற்றும் விறைப்பழுத்தம் 5 வளி.  அறை 'B'யின் சவ்வூடுபரவல் திறன் -10 வளி மற்றும் விரைப்பழுத்தம் O வளி, இந்நிலையில் நீரின் செல்லும் திசை யாது?</a:t>
-            </a:r>
-          </a:p>
-          <a:p>
-            <a:endParaRPr/>
-          </a:p>
-          <a:p>
-            <a:r>
+              <a:rPr dirty="0"/>
+              <a:t>Q - 5  A' </a:t>
+            </a:r>
+            <a:r>
+              <a:rPr dirty="0" err="1"/>
+              <a:t>மற்றும்</a:t>
+            </a:r>
+            <a:r>
+              <a:rPr dirty="0"/>
+              <a:t> 'B' </a:t>
+            </a:r>
+            <a:r>
+              <a:rPr dirty="0" err="1"/>
+              <a:t>ஆகிய</a:t>
+            </a:r>
+            <a:r>
+              <a:rPr dirty="0"/>
+              <a:t> </a:t>
+            </a:r>
+            <a:r>
+              <a:rPr dirty="0" err="1"/>
+              <a:t>இரு</a:t>
+            </a:r>
+            <a:r>
+              <a:rPr dirty="0"/>
+              <a:t> </a:t>
+            </a:r>
+            <a:r>
+              <a:rPr dirty="0" err="1"/>
+              <a:t>சவ்வூடுபரவல்</a:t>
+            </a:r>
+            <a:r>
+              <a:rPr dirty="0"/>
+              <a:t> </a:t>
+            </a:r>
+            <a:r>
+              <a:rPr dirty="0" err="1"/>
+              <a:t>அமைப்பு</a:t>
+            </a:r>
+            <a:r>
+              <a:rPr dirty="0"/>
+              <a:t> </a:t>
+            </a:r>
+            <a:r>
+              <a:rPr dirty="0" err="1"/>
+              <a:t>ஒரு</a:t>
+            </a:r>
+            <a:r>
+              <a:rPr dirty="0"/>
+              <a:t> </a:t>
+            </a:r>
+            <a:r>
+              <a:rPr dirty="0" err="1"/>
+              <a:t>அரைக்கடத்தி</a:t>
+            </a:r>
+            <a:r>
+              <a:rPr dirty="0"/>
+              <a:t> </a:t>
+            </a:r>
+            <a:r>
+              <a:rPr dirty="0" err="1"/>
+              <a:t>சவ்வினால்</a:t>
+            </a:r>
+            <a:r>
+              <a:rPr dirty="0"/>
+              <a:t> </a:t>
+            </a:r>
+            <a:r>
+              <a:rPr dirty="0" err="1"/>
+              <a:t>பிரிக்கப்படுள்ளது</a:t>
+            </a:r>
+            <a:r>
+              <a:rPr dirty="0"/>
+              <a:t>. </a:t>
+            </a:r>
+            <a:r>
+              <a:rPr dirty="0" err="1"/>
+              <a:t>அறை</a:t>
+            </a:r>
+            <a:r>
+              <a:rPr dirty="0"/>
+              <a:t> '</a:t>
+            </a:r>
+            <a:r>
+              <a:rPr dirty="0" err="1"/>
+              <a:t>A'வின்</a:t>
+            </a:r>
+            <a:r>
+              <a:rPr dirty="0"/>
+              <a:t> </a:t>
+            </a:r>
+            <a:r>
+              <a:rPr dirty="0" err="1"/>
+              <a:t>சவ்வூடுபரவல்</a:t>
+            </a:r>
+            <a:r>
+              <a:rPr dirty="0"/>
+              <a:t> </a:t>
+            </a:r>
+            <a:r>
+              <a:rPr dirty="0" err="1"/>
+              <a:t>திறன்</a:t>
+            </a:r>
+            <a:r>
+              <a:rPr dirty="0"/>
+              <a:t> -30 </a:t>
+            </a:r>
+            <a:r>
+              <a:rPr dirty="0" err="1"/>
+              <a:t>வளி</a:t>
+            </a:r>
+            <a:r>
+              <a:rPr dirty="0"/>
+              <a:t> </a:t>
+            </a:r>
+            <a:r>
+              <a:rPr dirty="0" err="1"/>
+              <a:t>மற்றும்</a:t>
+            </a:r>
+            <a:r>
+              <a:rPr dirty="0"/>
+              <a:t> </a:t>
+            </a:r>
+            <a:r>
+              <a:rPr dirty="0" err="1"/>
+              <a:t>விறைப்பழுத்தம்</a:t>
+            </a:r>
+            <a:r>
+              <a:rPr dirty="0"/>
+              <a:t> 5 </a:t>
+            </a:r>
+            <a:r>
+              <a:rPr dirty="0" err="1"/>
+              <a:t>வளி</a:t>
+            </a:r>
+            <a:r>
+              <a:rPr dirty="0"/>
+              <a:t>.  </a:t>
+            </a:r>
+            <a:r>
+              <a:rPr dirty="0" err="1"/>
+              <a:t>அறை</a:t>
+            </a:r>
+            <a:r>
+              <a:rPr dirty="0"/>
+              <a:t> '</a:t>
+            </a:r>
+            <a:r>
+              <a:rPr dirty="0" err="1"/>
+              <a:t>B'யின்</a:t>
+            </a:r>
+            <a:r>
+              <a:rPr dirty="0"/>
+              <a:t> </a:t>
+            </a:r>
+            <a:r>
+              <a:rPr dirty="0" err="1"/>
+              <a:t>சவ்வூடுபரவல்</a:t>
+            </a:r>
+            <a:r>
+              <a:rPr dirty="0"/>
+              <a:t> </a:t>
+            </a:r>
+            <a:r>
+              <a:rPr dirty="0" err="1"/>
+              <a:t>திறன்</a:t>
+            </a:r>
+            <a:r>
+              <a:rPr dirty="0"/>
+              <a:t> -10 </a:t>
+            </a:r>
+            <a:r>
+              <a:rPr dirty="0" err="1"/>
+              <a:t>வளி</a:t>
+            </a:r>
+            <a:r>
+              <a:rPr dirty="0"/>
+              <a:t> </a:t>
+            </a:r>
+            <a:r>
+              <a:rPr dirty="0" err="1"/>
+              <a:t>மற்றும்</a:t>
+            </a:r>
+            <a:r>
+              <a:rPr dirty="0"/>
+              <a:t> </a:t>
+            </a:r>
+            <a:r>
+              <a:rPr dirty="0" err="1"/>
+              <a:t>விரைப்பழுத்தம்</a:t>
+            </a:r>
+            <a:r>
+              <a:rPr dirty="0"/>
+              <a:t> O </a:t>
+            </a:r>
+            <a:r>
+              <a:rPr dirty="0" err="1"/>
+              <a:t>வளி</a:t>
+            </a:r>
+            <a:r>
+              <a:rPr dirty="0"/>
+              <a:t>, </a:t>
+            </a:r>
+            <a:r>
+              <a:rPr dirty="0" err="1"/>
+              <a:t>இந்நிலையில்</a:t>
+            </a:r>
+            <a:r>
+              <a:rPr dirty="0"/>
+              <a:t> </a:t>
+            </a:r>
+            <a:r>
+              <a:rPr dirty="0" err="1"/>
+              <a:t>நீரின்</a:t>
+            </a:r>
+            <a:r>
+              <a:rPr dirty="0"/>
+              <a:t> </a:t>
+            </a:r>
+            <a:r>
+              <a:rPr dirty="0" err="1"/>
+              <a:t>செல்லும்</a:t>
+            </a:r>
+            <a:r>
+              <a:rPr dirty="0"/>
+              <a:t> </a:t>
+            </a:r>
+            <a:r>
+              <a:rPr dirty="0" err="1"/>
+              <a:t>திசை</a:t>
+            </a:r>
+            <a:r>
+              <a:rPr dirty="0"/>
+              <a:t> </a:t>
+            </a:r>
+            <a:r>
+              <a:rPr dirty="0" err="1"/>
+              <a:t>யாது</a:t>
+            </a:r>
+            <a:r>
+              <a:rPr dirty="0"/>
+              <a:t>?</a:t>
+            </a:r>
+          </a:p>
+          <a:p>
+            <a:endParaRPr dirty="0"/>
+          </a:p>
+          <a:p>
+            <a:r>
+              <a:rPr dirty="0"/>
               <a:t>C.E.T. Karnataka - 2002</a:t>
             </a:r>
           </a:p>
           <a:p>
-            <a:endParaRPr/>
-          </a:p>
-          <a:p>
-            <a:r>
-              <a:t>அ) இரு திசையிலும் சம அளவில் செல்லும்</a:t>
-            </a:r>
-          </a:p>
-          <a:p>
-            <a:endParaRPr/>
-          </a:p>
-          <a:p>
-            <a:r>
-              <a:t>ஆ) B' இருந்து 'A'விற்கு செல்லும் </a:t>
-            </a:r>
-          </a:p>
-          <a:p>
-            <a:endParaRPr/>
-          </a:p>
-          <a:p>
-            <a:r>
-              <a:t>இ) எவ்வித இயக்கமும் இயங்காது</a:t>
-            </a:r>
-          </a:p>
-          <a:p>
-            <a:endParaRPr/>
-          </a:p>
-          <a:p>
-            <a:r>
-              <a:t>ஈ) A'விலிருந்து Bக்கு செல்லும்</a:t>
-            </a:r>
+            <a:endParaRPr dirty="0"/>
+          </a:p>
+          <a:p>
+            <a:r>
+              <a:rPr dirty="0"/>
+              <a:t>அ) </a:t>
+            </a:r>
+            <a:r>
+              <a:rPr dirty="0" err="1"/>
+              <a:t>இரு</a:t>
+            </a:r>
+            <a:r>
+              <a:rPr dirty="0"/>
+              <a:t> </a:t>
+            </a:r>
+            <a:r>
+              <a:rPr dirty="0" err="1"/>
+              <a:t>திசையிலும்</a:t>
+            </a:r>
+            <a:r>
+              <a:rPr dirty="0"/>
+              <a:t> </a:t>
+            </a:r>
+            <a:r>
+              <a:rPr dirty="0" err="1"/>
+              <a:t>சம</a:t>
+            </a:r>
+            <a:r>
+              <a:rPr dirty="0"/>
+              <a:t> </a:t>
+            </a:r>
+            <a:r>
+              <a:rPr dirty="0" err="1"/>
+              <a:t>அளவில்</a:t>
+            </a:r>
+            <a:r>
+              <a:rPr dirty="0"/>
+              <a:t> </a:t>
+            </a:r>
+            <a:r>
+              <a:rPr dirty="0" err="1"/>
+              <a:t>செல்லும்</a:t>
+            </a:r>
+            <a:endParaRPr dirty="0"/>
+          </a:p>
+          <a:p>
+            <a:endParaRPr dirty="0"/>
+          </a:p>
+          <a:p>
+            <a:r>
+              <a:rPr dirty="0"/>
+              <a:t>ஆ) B' </a:t>
+            </a:r>
+            <a:r>
+              <a:rPr dirty="0" err="1"/>
+              <a:t>இருந்து</a:t>
+            </a:r>
+            <a:r>
+              <a:rPr dirty="0"/>
+              <a:t> '</a:t>
+            </a:r>
+            <a:r>
+              <a:rPr dirty="0" err="1"/>
+              <a:t>A'விற்கு</a:t>
+            </a:r>
+            <a:r>
+              <a:rPr dirty="0"/>
+              <a:t> </a:t>
+            </a:r>
+            <a:r>
+              <a:rPr dirty="0" err="1"/>
+              <a:t>செல்லும்</a:t>
+            </a:r>
+            <a:r>
+              <a:rPr dirty="0"/>
+              <a:t> </a:t>
+            </a:r>
+          </a:p>
+          <a:p>
+            <a:endParaRPr dirty="0"/>
+          </a:p>
+          <a:p>
+            <a:r>
+              <a:rPr dirty="0"/>
+              <a:t>இ) </a:t>
+            </a:r>
+            <a:r>
+              <a:rPr dirty="0" err="1"/>
+              <a:t>எவ்வித</a:t>
+            </a:r>
+            <a:r>
+              <a:rPr dirty="0"/>
+              <a:t> </a:t>
+            </a:r>
+            <a:r>
+              <a:rPr dirty="0" err="1"/>
+              <a:t>இயக்கமும்</a:t>
+            </a:r>
+            <a:r>
+              <a:rPr dirty="0"/>
+              <a:t> </a:t>
+            </a:r>
+            <a:r>
+              <a:rPr dirty="0" err="1"/>
+              <a:t>இயங்காது</a:t>
+            </a:r>
+            <a:endParaRPr dirty="0"/>
+          </a:p>
+          <a:p>
+            <a:endParaRPr dirty="0"/>
+          </a:p>
+          <a:p>
+            <a:r>
+              <a:rPr dirty="0"/>
+              <a:t>ஈ) </a:t>
+            </a:r>
+            <a:r>
+              <a:rPr dirty="0" err="1"/>
+              <a:t>A'விலிருந்து</a:t>
+            </a:r>
+            <a:r>
+              <a:rPr dirty="0"/>
+              <a:t> </a:t>
+            </a:r>
+            <a:r>
+              <a:rPr dirty="0" err="1"/>
+              <a:t>Bக்கு</a:t>
+            </a:r>
+            <a:r>
+              <a:rPr dirty="0"/>
+              <a:t> </a:t>
+            </a:r>
+            <a:r>
+              <a:rPr dirty="0" err="1"/>
+              <a:t>செல்லும்</a:t>
+            </a:r>
+            <a:endParaRPr dirty="0"/>
           </a:p>
         </p:txBody>
       </p:sp>
@@ -3889,7 +4238,7 @@
               </a:defRPr>
             </a:pPr>
             <a:r>
-              <a:t>Q - 51  இளநீரில் காணப்படும் ஹார்மோன் </a:t>
+              <a:t>Q - 51  இளநீரில் காணப்படும் ஹார்மோன் எது?</a:t>
             </a:r>
           </a:p>
           <a:p>
@@ -4068,7 +4417,7 @@
               </a:defRPr>
             </a:pPr>
             <a:r>
-              <a:t>Q - 51  இளநீரில் காணப்படும் ஹார்மோன் </a:t>
+              <a:t>Q - 51  இளநீரில் காணப்படும் ஹார்மோன் எது?</a:t>
             </a:r>
           </a:p>
           <a:p>
@@ -4231,7 +4580,7 @@
               </a:defRPr>
             </a:pPr>
             <a:r>
-              <a:t>Q - 52  விதையில்லா வாழைக்கனி உருவாக காரணம் </a:t>
+              <a:t>Q - 52  விதையில்லா வாழைக்கனி உருவாக காரணம் என்ன?</a:t>
             </a:r>
           </a:p>
           <a:p>
@@ -4410,7 +4759,7 @@
               </a:defRPr>
             </a:pPr>
             <a:r>
-              <a:t>Q - 52  விதையில்லா வாழைக்கனி உருவாக காரணம் </a:t>
+              <a:t>Q - 52  விதையில்லா வாழைக்கனி உருவாக காரணம் என்ன?</a:t>
             </a:r>
           </a:p>
           <a:p>
@@ -4573,7 +4922,7 @@
               </a:defRPr>
             </a:pPr>
             <a:r>
-              <a:t>Q - 53  தாவர நுனிகள் துண்டிக்கப்பட்டு சீரமைக்கும் போது, கோண மொட்டின் வளர்ச்சி தூண்டப்பட்டு, கிளைகள் தோன்ற காரணமான ஹார்மோன். </a:t>
+              <a:t>Q - 53  தாவர நுனிகள் துண்டிக்கப்பட்டு சீரமைக்கும் போது, கோண மொட்டின் வளர்ச்சி தூண்டப்பட்டு, கிளைகள் தோன்ற காரணமான ஹார்மோன் எது? </a:t>
             </a:r>
           </a:p>
           <a:p>
@@ -4752,7 +5101,7 @@
               </a:defRPr>
             </a:pPr>
             <a:r>
-              <a:t>Q - 53  தாவர நுனிகள் துண்டிக்கப்பட்டு சீரமைக்கும் போது, கோண மொட்டின் வளர்ச்சி தூண்டப்பட்டு, கிளைகள் தோன்ற காரணமான ஹார்மோன். </a:t>
+              <a:t>Q - 53  தாவர நுனிகள் துண்டிக்கப்பட்டு சீரமைக்கும் போது, கோண மொட்டின் வளர்ச்சி தூண்டப்பட்டு, கிளைகள் தோன்ற காரணமான ஹார்மோன் எது? </a:t>
             </a:r>
           </a:p>
           <a:p>
@@ -4915,7 +5264,7 @@
               </a:defRPr>
             </a:pPr>
             <a:r>
-              <a:t>Q - 54  அவினா வளைவுச் சோதனை எனும் உயிரியல் ஆய்வு இதன் செயல்பாட்டினை அறிய உதவுகிறது </a:t>
+              <a:t>Q - 54  அவினா வளைவுச் சோதனை எனும் உயிரியல் ஆய்வு எதனுடைய செயல்பாட்டினை அறிய உதவுகிறது?</a:t>
             </a:r>
           </a:p>
           <a:p>
@@ -5094,7 +5443,7 @@
               </a:defRPr>
             </a:pPr>
             <a:r>
-              <a:t>Q - 54  அவினா வளைவுச் சோதனை எனும் உயிரியல் ஆய்வு இதன் செயல்பாட்டினை அறிய உதவுகிறது </a:t>
+              <a:t>Q - 54  அவினா வளைவுச் சோதனை எனும் உயிரியல் ஆய்வு எதனுடைய செயல்பாட்டினை அறிய உதவுகிறது?</a:t>
             </a:r>
           </a:p>
           <a:p>
@@ -5231,7 +5580,7 @@
         </p:nvSpPr>
         <p:spPr>
           <a:xfrm>
-            <a:off x="457200" y="1371600"/>
+            <a:off x="457200" y="741784"/>
             <a:ext cx="7315200" cy="3657600"/>
           </a:xfrm>
           <a:prstGeom prst="rect">
@@ -5245,7 +5594,7 @@
           </a:bodyPr>
           <a:lstStyle/>
           <a:p>
-            <a:endParaRPr/>
+            <a:endParaRPr dirty="0"/>
           </a:p>
           <a:p>
             <a:pPr>
@@ -5257,19 +5606,261 @@
               </a:defRPr>
             </a:pPr>
             <a:r>
-              <a:t>Q - 5  A' மற்றும் 'B' ஆகிய இரு சவ்வூடுபரவல் அமைப்பு ஒரு அரைக்கடத்தி சவ்வினால் பிரிக்கப்படுள்ளது. அறை 'A'வின் சவ்வூடுபரவல் திறன் -30 வளி மற்றும் விறைப்பழுத்தம் 5 வளி.  அறை 'B'யின் சவ்வூடுபரவல் திறன் -10 வளி மற்றும் விரைப்பழுத்தம் O வளி, இந்நிலையில் நீரின் செல்லும் திசை யாது?</a:t>
-            </a:r>
-          </a:p>
-          <a:p>
-            <a:endParaRPr/>
-          </a:p>
-          <a:p>
-            <a:r>
+              <a:rPr dirty="0"/>
+              <a:t>Q - 5  A' </a:t>
+            </a:r>
+            <a:r>
+              <a:rPr dirty="0" err="1"/>
+              <a:t>மற்றும்</a:t>
+            </a:r>
+            <a:r>
+              <a:rPr dirty="0"/>
+              <a:t> 'B' </a:t>
+            </a:r>
+            <a:r>
+              <a:rPr dirty="0" err="1"/>
+              <a:t>ஆகிய</a:t>
+            </a:r>
+            <a:r>
+              <a:rPr dirty="0"/>
+              <a:t> </a:t>
+            </a:r>
+            <a:r>
+              <a:rPr dirty="0" err="1"/>
+              <a:t>இரு</a:t>
+            </a:r>
+            <a:r>
+              <a:rPr dirty="0"/>
+              <a:t> </a:t>
+            </a:r>
+            <a:r>
+              <a:rPr dirty="0" err="1"/>
+              <a:t>சவ்வூடுபரவல்</a:t>
+            </a:r>
+            <a:r>
+              <a:rPr dirty="0"/>
+              <a:t> </a:t>
+            </a:r>
+            <a:r>
+              <a:rPr dirty="0" err="1"/>
+              <a:t>அமைப்பு</a:t>
+            </a:r>
+            <a:r>
+              <a:rPr dirty="0"/>
+              <a:t> </a:t>
+            </a:r>
+            <a:r>
+              <a:rPr dirty="0" err="1"/>
+              <a:t>ஒரு</a:t>
+            </a:r>
+            <a:r>
+              <a:rPr dirty="0"/>
+              <a:t> </a:t>
+            </a:r>
+            <a:r>
+              <a:rPr dirty="0" err="1"/>
+              <a:t>அரைக்கடத்தி</a:t>
+            </a:r>
+            <a:r>
+              <a:rPr dirty="0"/>
+              <a:t> </a:t>
+            </a:r>
+            <a:r>
+              <a:rPr dirty="0" err="1"/>
+              <a:t>சவ்வினால்</a:t>
+            </a:r>
+            <a:r>
+              <a:rPr dirty="0"/>
+              <a:t> </a:t>
+            </a:r>
+            <a:r>
+              <a:rPr dirty="0" err="1"/>
+              <a:t>பிரிக்கப்படுள்ளது</a:t>
+            </a:r>
+            <a:r>
+              <a:rPr dirty="0"/>
+              <a:t>. </a:t>
+            </a:r>
+            <a:r>
+              <a:rPr dirty="0" err="1"/>
+              <a:t>அறை</a:t>
+            </a:r>
+            <a:r>
+              <a:rPr dirty="0"/>
+              <a:t> '</a:t>
+            </a:r>
+            <a:r>
+              <a:rPr dirty="0" err="1"/>
+              <a:t>A'வின்</a:t>
+            </a:r>
+            <a:r>
+              <a:rPr dirty="0"/>
+              <a:t> </a:t>
+            </a:r>
+            <a:r>
+              <a:rPr dirty="0" err="1"/>
+              <a:t>சவ்வூடுபரவல்</a:t>
+            </a:r>
+            <a:r>
+              <a:rPr dirty="0"/>
+              <a:t> </a:t>
+            </a:r>
+            <a:r>
+              <a:rPr dirty="0" err="1"/>
+              <a:t>திறன்</a:t>
+            </a:r>
+            <a:r>
+              <a:rPr dirty="0"/>
+              <a:t> -30 </a:t>
+            </a:r>
+            <a:r>
+              <a:rPr dirty="0" err="1"/>
+              <a:t>வளி</a:t>
+            </a:r>
+            <a:r>
+              <a:rPr dirty="0"/>
+              <a:t> </a:t>
+            </a:r>
+            <a:r>
+              <a:rPr dirty="0" err="1"/>
+              <a:t>மற்றும்</a:t>
+            </a:r>
+            <a:r>
+              <a:rPr dirty="0"/>
+              <a:t> </a:t>
+            </a:r>
+            <a:r>
+              <a:rPr dirty="0" err="1"/>
+              <a:t>விறைப்பழுத்தம்</a:t>
+            </a:r>
+            <a:r>
+              <a:rPr dirty="0"/>
+              <a:t> 5 </a:t>
+            </a:r>
+            <a:r>
+              <a:rPr dirty="0" err="1"/>
+              <a:t>வளி</a:t>
+            </a:r>
+            <a:r>
+              <a:rPr dirty="0"/>
+              <a:t>.  </a:t>
+            </a:r>
+            <a:r>
+              <a:rPr dirty="0" err="1"/>
+              <a:t>அறை</a:t>
+            </a:r>
+            <a:r>
+              <a:rPr dirty="0"/>
+              <a:t> '</a:t>
+            </a:r>
+            <a:r>
+              <a:rPr dirty="0" err="1"/>
+              <a:t>B'யின்</a:t>
+            </a:r>
+            <a:r>
+              <a:rPr dirty="0"/>
+              <a:t> </a:t>
+            </a:r>
+            <a:r>
+              <a:rPr dirty="0" err="1"/>
+              <a:t>சவ்வூடுபரவல்</a:t>
+            </a:r>
+            <a:r>
+              <a:rPr dirty="0"/>
+              <a:t> </a:t>
+            </a:r>
+            <a:r>
+              <a:rPr dirty="0" err="1"/>
+              <a:t>திறன்</a:t>
+            </a:r>
+            <a:r>
+              <a:rPr dirty="0"/>
+              <a:t> -10 </a:t>
+            </a:r>
+            <a:r>
+              <a:rPr dirty="0" err="1"/>
+              <a:t>வளி</a:t>
+            </a:r>
+            <a:r>
+              <a:rPr dirty="0"/>
+              <a:t> </a:t>
+            </a:r>
+            <a:r>
+              <a:rPr dirty="0" err="1"/>
+              <a:t>மற்றும்</a:t>
+            </a:r>
+            <a:r>
+              <a:rPr dirty="0"/>
+              <a:t> </a:t>
+            </a:r>
+            <a:r>
+              <a:rPr dirty="0" err="1"/>
+              <a:t>விரைப்பழுத்தம்</a:t>
+            </a:r>
+            <a:r>
+              <a:rPr dirty="0"/>
+              <a:t> O </a:t>
+            </a:r>
+            <a:r>
+              <a:rPr dirty="0" err="1"/>
+              <a:t>வளி</a:t>
+            </a:r>
+            <a:r>
+              <a:rPr dirty="0"/>
+              <a:t>, </a:t>
+            </a:r>
+            <a:r>
+              <a:rPr dirty="0" err="1"/>
+              <a:t>இந்நிலையில்</a:t>
+            </a:r>
+            <a:r>
+              <a:rPr dirty="0"/>
+              <a:t> </a:t>
+            </a:r>
+            <a:r>
+              <a:rPr dirty="0" err="1"/>
+              <a:t>நீரின்</a:t>
+            </a:r>
+            <a:r>
+              <a:rPr dirty="0"/>
+              <a:t> </a:t>
+            </a:r>
+            <a:r>
+              <a:rPr dirty="0" err="1"/>
+              <a:t>செல்லும்</a:t>
+            </a:r>
+            <a:r>
+              <a:rPr dirty="0"/>
+              <a:t> </a:t>
+            </a:r>
+            <a:r>
+              <a:rPr dirty="0" err="1"/>
+              <a:t>திசை</a:t>
+            </a:r>
+            <a:r>
+              <a:rPr dirty="0"/>
+              <a:t> </a:t>
+            </a:r>
+            <a:r>
+              <a:rPr dirty="0" err="1"/>
+              <a:t>யாது</a:t>
+            </a:r>
+            <a:r>
+              <a:rPr dirty="0"/>
+              <a:t>?</a:t>
+            </a:r>
+          </a:p>
+          <a:p>
+            <a:endParaRPr dirty="0"/>
+          </a:p>
+          <a:p>
+            <a:r>
+              <a:rPr dirty="0"/>
               <a:t>C.E.T. Karnataka - 2002</a:t>
             </a:r>
           </a:p>
           <a:p>
-            <a:endParaRPr/>
+            <a:endParaRPr dirty="0"/>
           </a:p>
           <a:p>
             <a:pPr>
@@ -5281,7 +5872,32 @@
               </a:defRPr>
             </a:pPr>
             <a:r>
-              <a:t>ஆ) B' இருந்து 'A'விற்கு செல்லும் </a:t>
+              <a:rPr dirty="0"/>
+              <a:t>ஆ) B' </a:t>
+            </a:r>
+            <a:r>
+              <a:rPr dirty="0" err="1"/>
+              <a:t>இருந்து</a:t>
+            </a:r>
+            <a:r>
+              <a:rPr dirty="0"/>
+              <a:t> '</a:t>
+            </a:r>
+            <a:r>
+              <a:rPr dirty="0" err="1"/>
+              <a:t>A'விற்கு</a:t>
+            </a:r>
+            <a:r>
+              <a:rPr dirty="0"/>
+              <a:t> </a:t>
+            </a:r>
+            <a:r>
+              <a:rPr dirty="0" err="1"/>
+              <a:t>செல்லும்</a:t>
+            </a:r>
+            <a:r>
+              <a:rPr dirty="0"/>
+              <a:t> </a:t>
             </a:r>
           </a:p>
         </p:txBody>
@@ -5420,7 +6036,7 @@
               </a:defRPr>
             </a:pPr>
             <a:r>
-              <a:t>Q - 55  செயற்கை ஆக்சின் என்பது எது ?</a:t>
+              <a:t>Q - 55  செயற்கை ஆக்சின் என்பது எது?</a:t>
             </a:r>
           </a:p>
           <a:p>
@@ -5599,7 +6215,7 @@
               </a:defRPr>
             </a:pPr>
             <a:r>
-              <a:t>Q - 55  செயற்கை ஆக்சின் என்பது எது ?</a:t>
+              <a:t>Q - 55  செயற்கை ஆக்சின் என்பது எது?</a:t>
             </a:r>
           </a:p>
           <a:p>
@@ -5762,7 +6378,7 @@
               </a:defRPr>
             </a:pPr>
             <a:r>
-              <a:t>Q - 56  கரோட்டினாய்டு எனும் நிறமியிலிருந்து பெறப்படும் ஹார்மோன் </a:t>
+              <a:t>Q - 56  கரோட்டினாய்டு எனும் நிறமியிலிருந்து பெறப்படும் ஹார்மோன் எது? </a:t>
             </a:r>
           </a:p>
           <a:p>
@@ -5941,7 +6557,7 @@
               </a:defRPr>
             </a:pPr>
             <a:r>
-              <a:t>Q - 56  கரோட்டினாய்டு எனும் நிறமியிலிருந்து பெறப்படும் ஹார்மோன் </a:t>
+              <a:t>Q - 56  கரோட்டினாய்டு எனும் நிறமியிலிருந்து பெறப்படும் ஹார்மோன் எது? </a:t>
             </a:r>
           </a:p>
           <a:p>
@@ -6104,7 +6720,7 @@
               </a:defRPr>
             </a:pPr>
             <a:r>
-              <a:t>Q - 57  ஒளிக்காலத்துவம் முதன் முதலில் கண்டறியப்பட்ட தாவரம் </a:t>
+              <a:t>Q - 57  ஒளிக்காலத்துவம் முதன் முதலில் கண்டறியப்பட்ட தாவரத்தின் பெயர் என்ன?</a:t>
             </a:r>
           </a:p>
           <a:p>
@@ -6283,7 +6899,7 @@
               </a:defRPr>
             </a:pPr>
             <a:r>
-              <a:t>Q - 57  ஒளிக்காலத்துவம் முதன் முதலில் கண்டறியப்பட்ட தாவரம் </a:t>
+              <a:t>Q - 57  ஒளிக்காலத்துவம் முதன் முதலில் கண்டறியப்பட்ட தாவரத்தின் பெயர் என்ன?</a:t>
             </a:r>
           </a:p>
           <a:p>
@@ -6788,7 +7404,7 @@
               </a:defRPr>
             </a:pPr>
             <a:r>
-              <a:t>Q - 59  வேர் வளர்ச்சியை தூண்டுவது </a:t>
+              <a:t>Q - 59  வேர் வளர்ச்சியை தூண்டுவது எது? </a:t>
             </a:r>
           </a:p>
           <a:p>
@@ -6967,7 +7583,7 @@
               </a:defRPr>
             </a:pPr>
             <a:r>
-              <a:t>Q - 59  வேர் வளர்ச்சியை தூண்டுவது </a:t>
+              <a:t>Q - 59  வேர் வளர்ச்சியை தூண்டுவது எது? </a:t>
             </a:r>
           </a:p>
           <a:p>
@@ -7309,7 +7925,7 @@
               </a:defRPr>
             </a:pPr>
             <a:r>
-              <a:t>Q - 60  தாவர வளர்ச்சியில் நடைபெறும் மூப்படைதல் எனும் நிகழ்ச்சியை தெரிவிப்பது </a:t>
+              <a:t>Q - 60  எந்த நிகழ்வு தாவர வளர்ச்சியில் நடைபெறும் மூப்படைதல் எனும் நிகழ்ச்சியை தெரிவிக்கிறது?</a:t>
             </a:r>
           </a:p>
           <a:p>
@@ -7488,7 +8104,7 @@
               </a:defRPr>
             </a:pPr>
             <a:r>
-              <a:t>Q - 60  தாவர வளர்ச்சியில் நடைபெறும் மூப்படைதல் எனும் நிகழ்ச்சியை தெரிவிப்பது </a:t>
+              <a:t>Q - 60  எந்த நிகழ்வு தாவர வளர்ச்சியில் நடைபெறும் மூப்படைதல் எனும் நிகழ்ச்சியை தெரிவிக்கிறது?</a:t>
             </a:r>
           </a:p>
           <a:p>
@@ -7625,7 +8241,7 @@
         </p:nvSpPr>
         <p:spPr>
           <a:xfrm>
-            <a:off x="457200" y="1371600"/>
+            <a:off x="391885" y="704461"/>
             <a:ext cx="7315200" cy="3657600"/>
           </a:xfrm>
           <a:prstGeom prst="rect">
@@ -7639,7 +8255,7 @@
           </a:bodyPr>
           <a:lstStyle/>
           <a:p>
-            <a:endParaRPr/>
+            <a:endParaRPr dirty="0"/>
           </a:p>
           <a:p>
             <a:pPr>
@@ -7651,48 +8267,328 @@
               </a:defRPr>
             </a:pPr>
             <a:r>
-              <a:t>Q - 61  ஓர் செயற்கையான வளர்ப்பு முறையில் வேறுபாடு அடையச் செய்வதற்கு உங்களிடம் திசு கொடுக்கப்படுகிறது. கீழ்க்கண்ட எந்த இரண்டு ஹார்மோன்களை வளர்ப்பு ஊடகத்தில் நீங்கள் சேர்ப்பதால் திசுவிலிருந்து வேர் மற்றும் தண்டுத்தொகுப்பில் உருவாக்கப்படுகிறது?</a:t>
-            </a:r>
-          </a:p>
-          <a:p>
-            <a:endParaRPr/>
-          </a:p>
-          <a:p>
-            <a:r>
+              <a:rPr dirty="0"/>
+              <a:t>Q - 61  </a:t>
+            </a:r>
+            <a:r>
+              <a:rPr dirty="0" err="1"/>
+              <a:t>ஓர்</a:t>
+            </a:r>
+            <a:r>
+              <a:rPr dirty="0"/>
+              <a:t> </a:t>
+            </a:r>
+            <a:r>
+              <a:rPr dirty="0" err="1"/>
+              <a:t>செயற்கையான</a:t>
+            </a:r>
+            <a:r>
+              <a:rPr dirty="0"/>
+              <a:t> </a:t>
+            </a:r>
+            <a:r>
+              <a:rPr dirty="0" err="1"/>
+              <a:t>வளர்ப்பு</a:t>
+            </a:r>
+            <a:r>
+              <a:rPr dirty="0"/>
+              <a:t> </a:t>
+            </a:r>
+            <a:r>
+              <a:rPr dirty="0" err="1"/>
+              <a:t>முறையில்</a:t>
+            </a:r>
+            <a:r>
+              <a:rPr dirty="0"/>
+              <a:t> </a:t>
+            </a:r>
+            <a:r>
+              <a:rPr dirty="0" err="1"/>
+              <a:t>வேறுபாடு</a:t>
+            </a:r>
+            <a:r>
+              <a:rPr dirty="0"/>
+              <a:t> </a:t>
+            </a:r>
+            <a:r>
+              <a:rPr dirty="0" err="1"/>
+              <a:t>அடையச்</a:t>
+            </a:r>
+            <a:r>
+              <a:rPr dirty="0"/>
+              <a:t> </a:t>
+            </a:r>
+            <a:r>
+              <a:rPr dirty="0" err="1"/>
+              <a:t>செய்வதற்கு</a:t>
+            </a:r>
+            <a:r>
+              <a:rPr dirty="0"/>
+              <a:t>,  </a:t>
+            </a:r>
+            <a:r>
+              <a:rPr dirty="0" err="1"/>
+              <a:t>உங்களிடம்</a:t>
+            </a:r>
+            <a:r>
+              <a:rPr dirty="0"/>
+              <a:t> </a:t>
+            </a:r>
+            <a:r>
+              <a:rPr dirty="0" err="1"/>
+              <a:t>திசு</a:t>
+            </a:r>
+            <a:r>
+              <a:rPr dirty="0"/>
+              <a:t> </a:t>
+            </a:r>
+            <a:r>
+              <a:rPr dirty="0" err="1"/>
+              <a:t>கொடுக்கப்படுகிறது</a:t>
+            </a:r>
+            <a:r>
+              <a:rPr dirty="0"/>
+              <a:t>. </a:t>
+            </a:r>
+            <a:r>
+              <a:rPr dirty="0" err="1"/>
+              <a:t>கீழ்க்கண்ட</a:t>
+            </a:r>
+            <a:r>
+              <a:rPr dirty="0"/>
+              <a:t> </a:t>
+            </a:r>
+            <a:r>
+              <a:rPr dirty="0" err="1"/>
+              <a:t>எந்த</a:t>
+            </a:r>
+            <a:r>
+              <a:rPr dirty="0"/>
+              <a:t> </a:t>
+            </a:r>
+            <a:r>
+              <a:rPr dirty="0" err="1"/>
+              <a:t>இரண்டு</a:t>
+            </a:r>
+            <a:r>
+              <a:rPr dirty="0"/>
+              <a:t> </a:t>
+            </a:r>
+            <a:r>
+              <a:rPr dirty="0" err="1"/>
+              <a:t>ஹார்மோன்களை</a:t>
+            </a:r>
+            <a:r>
+              <a:rPr dirty="0"/>
+              <a:t> </a:t>
+            </a:r>
+            <a:r>
+              <a:rPr dirty="0" err="1"/>
+              <a:t>வளர்ப்பு</a:t>
+            </a:r>
+            <a:r>
+              <a:rPr dirty="0"/>
+              <a:t> </a:t>
+            </a:r>
+            <a:r>
+              <a:rPr dirty="0" err="1"/>
+              <a:t>ஊடகத்தில்</a:t>
+            </a:r>
+            <a:r>
+              <a:rPr dirty="0"/>
+              <a:t> </a:t>
+            </a:r>
+            <a:r>
+              <a:rPr dirty="0" err="1"/>
+              <a:t>நீங்கள்</a:t>
+            </a:r>
+            <a:r>
+              <a:rPr dirty="0"/>
+              <a:t> </a:t>
+            </a:r>
+            <a:r>
+              <a:rPr dirty="0" err="1"/>
+              <a:t>சேர்ப்பதால்</a:t>
+            </a:r>
+            <a:r>
+              <a:rPr dirty="0"/>
+              <a:t>, </a:t>
+            </a:r>
+            <a:r>
+              <a:rPr dirty="0" err="1"/>
+              <a:t>திசுவிலிருந்து</a:t>
+            </a:r>
+            <a:r>
+              <a:rPr dirty="0"/>
+              <a:t> </a:t>
+            </a:r>
+            <a:r>
+              <a:rPr dirty="0" err="1"/>
+              <a:t>வேர்</a:t>
+            </a:r>
+            <a:r>
+              <a:rPr dirty="0"/>
+              <a:t> </a:t>
+            </a:r>
+            <a:r>
+              <a:rPr dirty="0" err="1"/>
+              <a:t>மற்றும்</a:t>
+            </a:r>
+            <a:r>
+              <a:rPr dirty="0"/>
+              <a:t> </a:t>
+            </a:r>
+            <a:r>
+              <a:rPr dirty="0" err="1"/>
+              <a:t>தண்டுத்தொகுப்பு</a:t>
+            </a:r>
+            <a:r>
+              <a:rPr dirty="0"/>
+              <a:t> </a:t>
+            </a:r>
+            <a:r>
+              <a:rPr dirty="0" err="1"/>
+              <a:t>உருவாக்கப்படுகிறது</a:t>
+            </a:r>
+            <a:r>
+              <a:rPr dirty="0"/>
+              <a:t>?</a:t>
+            </a:r>
+          </a:p>
+          <a:p>
+            <a:endParaRPr dirty="0"/>
+          </a:p>
+          <a:p>
+            <a:r>
+              <a:rPr dirty="0"/>
               <a:t>NEET - 2016</a:t>
             </a:r>
           </a:p>
           <a:p>
-            <a:endParaRPr/>
-          </a:p>
-          <a:p>
-            <a:r>
-              <a:t>அ) ஜிப்ரலின்கள் மற்றும் அப்சசிக் அமிலம் </a:t>
-            </a:r>
-          </a:p>
-          <a:p>
-            <a:endParaRPr/>
-          </a:p>
-          <a:p>
-            <a:r>
-              <a:t>ஆ) IAA மற்றும் ஜிப்ரலின்</a:t>
-            </a:r>
-          </a:p>
-          <a:p>
-            <a:endParaRPr/>
-          </a:p>
-          <a:p>
-            <a:r>
-              <a:t>இ) ஆக்சின் மற்றும் சைட்டோகைனின் </a:t>
-            </a:r>
-          </a:p>
-          <a:p>
-            <a:endParaRPr/>
-          </a:p>
-          <a:p>
-            <a:r>
-              <a:t>ஈ) ஆக்சின் மற்றும் ஜிப்ரலின்கள்</a:t>
-            </a:r>
+            <a:endParaRPr dirty="0"/>
+          </a:p>
+          <a:p>
+            <a:r>
+              <a:rPr dirty="0"/>
+              <a:t>அ) </a:t>
+            </a:r>
+            <a:r>
+              <a:rPr dirty="0" err="1"/>
+              <a:t>ஜிப்ரலின்கள்</a:t>
+            </a:r>
+            <a:r>
+              <a:rPr dirty="0"/>
+              <a:t> </a:t>
+            </a:r>
+            <a:r>
+              <a:rPr dirty="0" err="1"/>
+              <a:t>மற்றும்</a:t>
+            </a:r>
+            <a:r>
+              <a:rPr dirty="0"/>
+              <a:t> </a:t>
+            </a:r>
+            <a:r>
+              <a:rPr dirty="0" err="1"/>
+              <a:t>அப்சசிக்</a:t>
+            </a:r>
+            <a:r>
+              <a:rPr dirty="0"/>
+              <a:t> </a:t>
+            </a:r>
+            <a:r>
+              <a:rPr dirty="0" err="1"/>
+              <a:t>அமிலம்</a:t>
+            </a:r>
+            <a:r>
+              <a:rPr dirty="0"/>
+              <a:t> </a:t>
+            </a:r>
+          </a:p>
+          <a:p>
+            <a:endParaRPr dirty="0"/>
+          </a:p>
+          <a:p>
+            <a:r>
+              <a:rPr dirty="0"/>
+              <a:t>ஆ) IAA </a:t>
+            </a:r>
+            <a:r>
+              <a:rPr dirty="0" err="1"/>
+              <a:t>மற்றும்</a:t>
+            </a:r>
+            <a:r>
+              <a:rPr dirty="0"/>
+              <a:t> </a:t>
+            </a:r>
+            <a:r>
+              <a:rPr dirty="0" err="1"/>
+              <a:t>ஜிப்ரலின்</a:t>
+            </a:r>
+            <a:endParaRPr dirty="0"/>
+          </a:p>
+          <a:p>
+            <a:endParaRPr dirty="0"/>
+          </a:p>
+          <a:p>
+            <a:r>
+              <a:rPr dirty="0"/>
+              <a:t>இ) </a:t>
+            </a:r>
+            <a:r>
+              <a:rPr dirty="0" err="1"/>
+              <a:t>ஆக்சின்</a:t>
+            </a:r>
+            <a:r>
+              <a:rPr dirty="0"/>
+              <a:t> </a:t>
+            </a:r>
+            <a:r>
+              <a:rPr dirty="0" err="1"/>
+              <a:t>மற்றும்</a:t>
+            </a:r>
+            <a:r>
+              <a:rPr dirty="0"/>
+              <a:t> </a:t>
+            </a:r>
+            <a:r>
+              <a:rPr dirty="0" err="1"/>
+              <a:t>சைட்டோகைனின்</a:t>
+            </a:r>
+            <a:r>
+              <a:rPr dirty="0"/>
+              <a:t> </a:t>
+            </a:r>
+          </a:p>
+          <a:p>
+            <a:endParaRPr dirty="0"/>
+          </a:p>
+          <a:p>
+            <a:r>
+              <a:rPr dirty="0"/>
+              <a:t>ஈ) </a:t>
+            </a:r>
+            <a:r>
+              <a:rPr dirty="0" err="1"/>
+              <a:t>ஆக்சின்</a:t>
+            </a:r>
+            <a:r>
+              <a:rPr dirty="0"/>
+              <a:t> </a:t>
+            </a:r>
+            <a:r>
+              <a:rPr dirty="0" err="1"/>
+              <a:t>மற்றும்</a:t>
+            </a:r>
+            <a:r>
+              <a:rPr dirty="0"/>
+              <a:t> </a:t>
+            </a:r>
+            <a:r>
+              <a:rPr dirty="0" err="1"/>
+              <a:t>ஜிப்ரலின்கள்</a:t>
+            </a:r>
+            <a:endParaRPr dirty="0"/>
           </a:p>
         </p:txBody>
       </p:sp>
@@ -7804,7 +8700,7 @@
         </p:nvSpPr>
         <p:spPr>
           <a:xfrm>
-            <a:off x="457200" y="1371600"/>
+            <a:off x="457200" y="821094"/>
             <a:ext cx="7315200" cy="3657600"/>
           </a:xfrm>
           <a:prstGeom prst="rect">
@@ -7818,7 +8714,7 @@
           </a:bodyPr>
           <a:lstStyle/>
           <a:p>
-            <a:endParaRPr/>
+            <a:endParaRPr dirty="0"/>
           </a:p>
           <a:p>
             <a:pPr>
@@ -7830,19 +8726,205 @@
               </a:defRPr>
             </a:pPr>
             <a:r>
-              <a:t>Q - 61  ஓர் செயற்கையான வளர்ப்பு முறையில் வேறுபாடு அடையச் செய்வதற்கு உங்களிடம் திசு கொடுக்கப்படுகிறது. கீழ்க்கண்ட எந்த இரண்டு ஹார்மோன்களை வளர்ப்பு ஊடகத்தில் நீங்கள் சேர்ப்பதால் திசுவிலிருந்து வேர் மற்றும் தண்டுத்தொகுப்பில் உருவாக்கப்படுகிறது?</a:t>
-            </a:r>
-          </a:p>
-          <a:p>
-            <a:endParaRPr/>
-          </a:p>
-          <a:p>
-            <a:r>
+              <a:rPr dirty="0"/>
+              <a:t>Q - 61  </a:t>
+            </a:r>
+            <a:r>
+              <a:rPr dirty="0" err="1"/>
+              <a:t>ஓர்</a:t>
+            </a:r>
+            <a:r>
+              <a:rPr dirty="0"/>
+              <a:t> </a:t>
+            </a:r>
+            <a:r>
+              <a:rPr dirty="0" err="1"/>
+              <a:t>செயற்கையான</a:t>
+            </a:r>
+            <a:r>
+              <a:rPr dirty="0"/>
+              <a:t> </a:t>
+            </a:r>
+            <a:r>
+              <a:rPr dirty="0" err="1"/>
+              <a:t>வளர்ப்பு</a:t>
+            </a:r>
+            <a:r>
+              <a:rPr dirty="0"/>
+              <a:t> </a:t>
+            </a:r>
+            <a:r>
+              <a:rPr dirty="0" err="1"/>
+              <a:t>முறையில்</a:t>
+            </a:r>
+            <a:r>
+              <a:rPr dirty="0"/>
+              <a:t> </a:t>
+            </a:r>
+            <a:r>
+              <a:rPr dirty="0" err="1"/>
+              <a:t>வேறுபாடு</a:t>
+            </a:r>
+            <a:r>
+              <a:rPr dirty="0"/>
+              <a:t> </a:t>
+            </a:r>
+            <a:r>
+              <a:rPr dirty="0" err="1"/>
+              <a:t>அடையச்</a:t>
+            </a:r>
+            <a:r>
+              <a:rPr dirty="0"/>
+              <a:t> </a:t>
+            </a:r>
+            <a:r>
+              <a:rPr dirty="0" err="1"/>
+              <a:t>செய்வதற்கு</a:t>
+            </a:r>
+            <a:r>
+              <a:rPr dirty="0"/>
+              <a:t>,  </a:t>
+            </a:r>
+            <a:r>
+              <a:rPr dirty="0" err="1"/>
+              <a:t>உங்களிடம்</a:t>
+            </a:r>
+            <a:r>
+              <a:rPr dirty="0"/>
+              <a:t> </a:t>
+            </a:r>
+            <a:r>
+              <a:rPr dirty="0" err="1"/>
+              <a:t>திசு</a:t>
+            </a:r>
+            <a:r>
+              <a:rPr dirty="0"/>
+              <a:t> </a:t>
+            </a:r>
+            <a:r>
+              <a:rPr dirty="0" err="1"/>
+              <a:t>கொடுக்கப்படுகிறது</a:t>
+            </a:r>
+            <a:r>
+              <a:rPr dirty="0"/>
+              <a:t>. </a:t>
+            </a:r>
+            <a:r>
+              <a:rPr dirty="0" err="1"/>
+              <a:t>கீழ்க்கண்ட</a:t>
+            </a:r>
+            <a:r>
+              <a:rPr dirty="0"/>
+              <a:t> </a:t>
+            </a:r>
+            <a:r>
+              <a:rPr dirty="0" err="1"/>
+              <a:t>எந்த</a:t>
+            </a:r>
+            <a:r>
+              <a:rPr dirty="0"/>
+              <a:t> </a:t>
+            </a:r>
+            <a:r>
+              <a:rPr dirty="0" err="1"/>
+              <a:t>இரண்டு</a:t>
+            </a:r>
+            <a:r>
+              <a:rPr dirty="0"/>
+              <a:t> </a:t>
+            </a:r>
+            <a:r>
+              <a:rPr dirty="0" err="1"/>
+              <a:t>ஹார்மோன்களை</a:t>
+            </a:r>
+            <a:r>
+              <a:rPr dirty="0"/>
+              <a:t> </a:t>
+            </a:r>
+            <a:r>
+              <a:rPr dirty="0" err="1"/>
+              <a:t>வளர்ப்பு</a:t>
+            </a:r>
+            <a:r>
+              <a:rPr dirty="0"/>
+              <a:t> </a:t>
+            </a:r>
+            <a:r>
+              <a:rPr dirty="0" err="1"/>
+              <a:t>ஊடகத்தில்</a:t>
+            </a:r>
+            <a:r>
+              <a:rPr dirty="0"/>
+              <a:t> </a:t>
+            </a:r>
+            <a:r>
+              <a:rPr dirty="0" err="1"/>
+              <a:t>நீங்கள்</a:t>
+            </a:r>
+            <a:r>
+              <a:rPr dirty="0"/>
+              <a:t> </a:t>
+            </a:r>
+            <a:r>
+              <a:rPr dirty="0" err="1"/>
+              <a:t>சேர்ப்பதால்</a:t>
+            </a:r>
+            <a:r>
+              <a:rPr dirty="0"/>
+              <a:t>, </a:t>
+            </a:r>
+            <a:r>
+              <a:rPr dirty="0" err="1"/>
+              <a:t>திசுவிலிருந்து</a:t>
+            </a:r>
+            <a:r>
+              <a:rPr dirty="0"/>
+              <a:t> </a:t>
+            </a:r>
+            <a:r>
+              <a:rPr dirty="0" err="1"/>
+              <a:t>வேர்</a:t>
+            </a:r>
+            <a:r>
+              <a:rPr dirty="0"/>
+              <a:t> </a:t>
+            </a:r>
+            <a:r>
+              <a:rPr dirty="0" err="1"/>
+              <a:t>மற்றும்</a:t>
+            </a:r>
+            <a:r>
+              <a:rPr dirty="0"/>
+              <a:t> </a:t>
+            </a:r>
+            <a:r>
+              <a:rPr dirty="0" err="1"/>
+              <a:t>தண்டுத்தொகுப்பு</a:t>
+            </a:r>
+            <a:r>
+              <a:rPr dirty="0"/>
+              <a:t> </a:t>
+            </a:r>
+            <a:r>
+              <a:rPr dirty="0" err="1"/>
+              <a:t>உருவாக்கப்படுகிறது</a:t>
+            </a:r>
+            <a:r>
+              <a:rPr dirty="0"/>
+              <a:t>?</a:t>
+            </a:r>
+          </a:p>
+          <a:p>
+            <a:endParaRPr dirty="0"/>
+          </a:p>
+          <a:p>
+            <a:r>
+              <a:rPr dirty="0"/>
               <a:t>NEET - 2016</a:t>
             </a:r>
           </a:p>
           <a:p>
-            <a:endParaRPr/>
+            <a:endParaRPr dirty="0"/>
           </a:p>
           <a:p>
             <a:pPr>
@@ -7854,7 +8936,32 @@
               </a:defRPr>
             </a:pPr>
             <a:r>
-              <a:t>இ) ஆக்சின் மற்றும் சைட்டோகைனின் </a:t>
+              <a:rPr dirty="0"/>
+              <a:t>இ) </a:t>
+            </a:r>
+            <a:r>
+              <a:rPr dirty="0" err="1"/>
+              <a:t>ஆக்சின்</a:t>
+            </a:r>
+            <a:r>
+              <a:rPr dirty="0"/>
+              <a:t> </a:t>
+            </a:r>
+            <a:r>
+              <a:rPr dirty="0" err="1"/>
+              <a:t>மற்றும்</a:t>
+            </a:r>
+            <a:r>
+              <a:rPr dirty="0"/>
+              <a:t> </a:t>
+            </a:r>
+            <a:r>
+              <a:rPr dirty="0" err="1"/>
+              <a:t>சைட்டோகைனின்</a:t>
+            </a:r>
+            <a:r>
+              <a:rPr dirty="0"/>
+              <a:t> </a:t>
             </a:r>
           </a:p>
         </p:txBody>
@@ -7993,7 +9100,7 @@
               </a:defRPr>
             </a:pPr>
             <a:r>
-              <a:t>Q - 62  பைட்டோகுரோம் என்பது </a:t>
+              <a:t>Q - 62  பைட்டோகுரோம் என்பது என்ன?</a:t>
             </a:r>
           </a:p>
           <a:p>
@@ -8172,7 +9279,7 @@
               </a:defRPr>
             </a:pPr>
             <a:r>
-              <a:t>Q - 62  பைட்டோகுரோம் என்பது </a:t>
+              <a:t>Q - 62  பைட்டோகுரோம் என்பது என்ன?</a:t>
             </a:r>
           </a:p>
           <a:p>
@@ -8310,7 +9417,7 @@
         <p:spPr>
           <a:xfrm>
             <a:off x="457200" y="1371600"/>
-            <a:ext cx="7315200" cy="3657600"/>
+            <a:ext cx="7315200" cy="3385542"/>
           </a:xfrm>
           <a:prstGeom prst="rect">
             <a:avLst/>
@@ -8323,7 +9430,7 @@
           </a:bodyPr>
           <a:lstStyle/>
           <a:p>
-            <a:endParaRPr/>
+            <a:endParaRPr dirty="0"/>
           </a:p>
           <a:p>
             <a:pPr>
@@ -8335,48 +9442,119 @@
               </a:defRPr>
             </a:pPr>
             <a:r>
-              <a:t>Q - 63  தாவரங்களில் வளர்ச்சி வளைவு </a:t>
-            </a:r>
-          </a:p>
-          <a:p>
-            <a:endParaRPr/>
-          </a:p>
-          <a:p>
-            <a:r>
+              <a:rPr lang="en-US" sz="1600" dirty="0"/>
+              <a:t>Q - 63  </a:t>
+            </a:r>
+            <a:r>
+              <a:rPr lang="ta-IN" sz="1600" dirty="0"/>
+              <a:t>தாவரங்களின் வளர்ச்சி வளைவின் வடிவம் என்ன?</a:t>
+            </a:r>
+          </a:p>
+          <a:p>
+            <a:endParaRPr dirty="0"/>
+          </a:p>
+          <a:p>
+            <a:r>
+              <a:rPr dirty="0"/>
               <a:t>NEET - 2016</a:t>
             </a:r>
           </a:p>
           <a:p>
-            <a:endParaRPr/>
-          </a:p>
-          <a:p>
-            <a:r>
-              <a:t>அ) நேரானது </a:t>
-            </a:r>
-          </a:p>
-          <a:p>
-            <a:endParaRPr/>
-          </a:p>
-          <a:p>
-            <a:r>
-              <a:t>ஆ) படி வடிவம் </a:t>
-            </a:r>
-          </a:p>
-          <a:p>
-            <a:endParaRPr/>
-          </a:p>
-          <a:p>
-            <a:r>
-              <a:t>இ) பரவளைய </a:t>
-            </a:r>
-          </a:p>
-          <a:p>
-            <a:endParaRPr/>
-          </a:p>
-          <a:p>
-            <a:r>
-              <a:t>ஈ) சிக்மாய்டு </a:t>
-            </a:r>
+            <a:endParaRPr dirty="0"/>
+          </a:p>
+          <a:p>
+            <a:r>
+              <a:rPr dirty="0"/>
+              <a:t>அ) </a:t>
+            </a:r>
+            <a:r>
+              <a:rPr dirty="0" err="1"/>
+              <a:t>நேரான</a:t>
+            </a:r>
+            <a:r>
+              <a:rPr dirty="0"/>
+              <a:t> </a:t>
+            </a:r>
+            <a:r>
+              <a:rPr dirty="0" err="1"/>
+              <a:t>வடிவம்</a:t>
+            </a:r>
+            <a:r>
+              <a:rPr dirty="0"/>
+              <a:t> </a:t>
+            </a:r>
+          </a:p>
+          <a:p>
+            <a:endParaRPr dirty="0"/>
+          </a:p>
+          <a:p>
+            <a:r>
+              <a:rPr dirty="0"/>
+              <a:t>ஆ) </a:t>
+            </a:r>
+            <a:r>
+              <a:rPr dirty="0" err="1"/>
+              <a:t>படி</a:t>
+            </a:r>
+            <a:r>
+              <a:rPr dirty="0"/>
+              <a:t> </a:t>
+            </a:r>
+            <a:r>
+              <a:rPr dirty="0" err="1"/>
+              <a:t>வடிவம்</a:t>
+            </a:r>
+            <a:r>
+              <a:rPr dirty="0"/>
+              <a:t> </a:t>
+            </a:r>
+          </a:p>
+          <a:p>
+            <a:endParaRPr dirty="0"/>
+          </a:p>
+          <a:p>
+            <a:r>
+              <a:rPr dirty="0"/>
+              <a:t>இ) </a:t>
+            </a:r>
+            <a:r>
+              <a:rPr dirty="0" err="1"/>
+              <a:t>பரவளைய</a:t>
+            </a:r>
+            <a:r>
+              <a:rPr dirty="0"/>
+              <a:t> </a:t>
+            </a:r>
+            <a:r>
+              <a:rPr dirty="0" err="1"/>
+              <a:t>வடிவம்</a:t>
+            </a:r>
+            <a:r>
+              <a:rPr dirty="0"/>
+              <a:t> </a:t>
+            </a:r>
+          </a:p>
+          <a:p>
+            <a:endParaRPr dirty="0"/>
+          </a:p>
+          <a:p>
+            <a:r>
+              <a:rPr dirty="0"/>
+              <a:t>ஈ) </a:t>
+            </a:r>
+            <a:r>
+              <a:rPr dirty="0" err="1"/>
+              <a:t>சிக்மாய்டு</a:t>
+            </a:r>
+            <a:r>
+              <a:rPr dirty="0"/>
+              <a:t> </a:t>
+            </a:r>
+            <a:r>
+              <a:rPr dirty="0" err="1"/>
+              <a:t>வடிவம்</a:t>
+            </a:r>
+            <a:endParaRPr dirty="0"/>
           </a:p>
         </p:txBody>
       </p:sp>
@@ -8489,7 +9667,7 @@
         <p:spPr>
           <a:xfrm>
             <a:off x="457200" y="1371600"/>
-            <a:ext cx="7315200" cy="3657600"/>
+            <a:ext cx="7315200" cy="1815882"/>
           </a:xfrm>
           <a:prstGeom prst="rect">
             <a:avLst/>
@@ -8502,7 +9680,7 @@
           </a:bodyPr>
           <a:lstStyle/>
           <a:p>
-            <a:endParaRPr/>
+            <a:endParaRPr dirty="0"/>
           </a:p>
           <a:p>
             <a:pPr>
@@ -8514,19 +9692,98 @@
               </a:defRPr>
             </a:pPr>
             <a:r>
-              <a:t>Q - 63  தாவரங்களில் வளர்ச்சி வளைவு </a:t>
-            </a:r>
-          </a:p>
-          <a:p>
-            <a:endParaRPr/>
-          </a:p>
-          <a:p>
-            <a:r>
+              <a:rPr sz="1600" dirty="0">
+                <a:latin typeface="Latha" panose="020B0604020202020204" pitchFamily="34" charset="0"/>
+                <a:cs typeface="Latha" panose="020B0604020202020204" pitchFamily="34" charset="0"/>
+              </a:rPr>
+              <a:t>Q - 63  </a:t>
+            </a:r>
+            <a:r>
+              <a:rPr sz="1600" dirty="0" err="1">
+                <a:latin typeface="Latha" panose="020B0604020202020204" pitchFamily="34" charset="0"/>
+                <a:cs typeface="Latha" panose="020B0604020202020204" pitchFamily="34" charset="0"/>
+              </a:rPr>
+              <a:t>தாவரங்களி</a:t>
+            </a:r>
+            <a:r>
+              <a:rPr lang="ta-IN" sz="1600" dirty="0"/>
+              <a:t>ன்</a:t>
+            </a:r>
+            <a:r>
+              <a:rPr sz="1600" dirty="0">
+                <a:latin typeface="Latha" panose="020B0604020202020204" pitchFamily="34" charset="0"/>
+                <a:cs typeface="Latha" panose="020B0604020202020204" pitchFamily="34" charset="0"/>
+              </a:rPr>
+              <a:t> </a:t>
+            </a:r>
+            <a:r>
+              <a:rPr sz="1600" dirty="0" err="1">
+                <a:latin typeface="Latha" panose="020B0604020202020204" pitchFamily="34" charset="0"/>
+                <a:cs typeface="Latha" panose="020B0604020202020204" pitchFamily="34" charset="0"/>
+              </a:rPr>
+              <a:t>வளர்ச்சி</a:t>
+            </a:r>
+            <a:r>
+              <a:rPr sz="1600" dirty="0">
+                <a:latin typeface="Latha" panose="020B0604020202020204" pitchFamily="34" charset="0"/>
+                <a:cs typeface="Latha" panose="020B0604020202020204" pitchFamily="34" charset="0"/>
+              </a:rPr>
+              <a:t> </a:t>
+            </a:r>
+            <a:r>
+              <a:rPr sz="1600" dirty="0" err="1">
+                <a:latin typeface="Latha" panose="020B0604020202020204" pitchFamily="34" charset="0"/>
+                <a:cs typeface="Latha" panose="020B0604020202020204" pitchFamily="34" charset="0"/>
+              </a:rPr>
+              <a:t>வளைவின்</a:t>
+            </a:r>
+            <a:r>
+              <a:rPr sz="1600" dirty="0">
+                <a:latin typeface="Latha" panose="020B0604020202020204" pitchFamily="34" charset="0"/>
+                <a:cs typeface="Latha" panose="020B0604020202020204" pitchFamily="34" charset="0"/>
+              </a:rPr>
+              <a:t> </a:t>
+            </a:r>
+            <a:r>
+              <a:rPr sz="1600" dirty="0" err="1">
+                <a:latin typeface="Latha" panose="020B0604020202020204" pitchFamily="34" charset="0"/>
+                <a:cs typeface="Latha" panose="020B0604020202020204" pitchFamily="34" charset="0"/>
+              </a:rPr>
+              <a:t>வடிவம்</a:t>
+            </a:r>
+            <a:r>
+              <a:rPr sz="1600" dirty="0">
+                <a:latin typeface="Latha" panose="020B0604020202020204" pitchFamily="34" charset="0"/>
+                <a:cs typeface="Latha" panose="020B0604020202020204" pitchFamily="34" charset="0"/>
+              </a:rPr>
+              <a:t> </a:t>
+            </a:r>
+            <a:r>
+              <a:rPr sz="1600" dirty="0" err="1">
+                <a:latin typeface="Latha" panose="020B0604020202020204" pitchFamily="34" charset="0"/>
+                <a:cs typeface="Latha" panose="020B0604020202020204" pitchFamily="34" charset="0"/>
+              </a:rPr>
+              <a:t>என்ன</a:t>
+            </a:r>
+            <a:r>
+              <a:rPr sz="1600" dirty="0">
+                <a:latin typeface="Latha" panose="020B0604020202020204" pitchFamily="34" charset="0"/>
+                <a:cs typeface="Latha" panose="020B0604020202020204" pitchFamily="34" charset="0"/>
+              </a:rPr>
+              <a:t>?</a:t>
+            </a:r>
+          </a:p>
+          <a:p>
+            <a:endParaRPr dirty="0"/>
+          </a:p>
+          <a:p>
+            <a:r>
+              <a:rPr dirty="0"/>
               <a:t>NEET - 2016</a:t>
             </a:r>
           </a:p>
           <a:p>
-            <a:endParaRPr/>
+            <a:endParaRPr dirty="0"/>
           </a:p>
           <a:p>
             <a:pPr>
@@ -8538,8 +9795,22 @@
               </a:defRPr>
             </a:pPr>
             <a:r>
-              <a:t>ஈ) சிக்மாய்டு </a:t>
-            </a:r>
+              <a:rPr dirty="0"/>
+              <a:t>ஈ) </a:t>
+            </a:r>
+            <a:r>
+              <a:rPr dirty="0" err="1"/>
+              <a:t>சிக்மாய்டு</a:t>
+            </a:r>
+            <a:r>
+              <a:rPr dirty="0"/>
+              <a:t> </a:t>
+            </a:r>
+            <a:r>
+              <a:rPr dirty="0" err="1"/>
+              <a:t>வடிவம்</a:t>
+            </a:r>
+            <a:endParaRPr dirty="0"/>
           </a:p>
         </p:txBody>
       </p:sp>
@@ -17885,7 +19156,7 @@
         </p:nvSpPr>
         <p:spPr>
           <a:xfrm>
-            <a:off x="457200" y="1371600"/>
+            <a:off x="457200" y="914400"/>
             <a:ext cx="7315200" cy="3657600"/>
           </a:xfrm>
           <a:prstGeom prst="rect">
@@ -17899,7 +19170,7 @@
           </a:bodyPr>
           <a:lstStyle/>
           <a:p>
-            <a:endParaRPr/>
+            <a:endParaRPr dirty="0"/>
           </a:p>
           <a:p>
             <a:pPr>
@@ -17911,47 +19182,285 @@
               </a:defRPr>
             </a:pPr>
             <a:r>
-              <a:t>Q - 31  கீழ்க்கண்ட நான்கு கூற்றுகளில் எது சரியானது என கண்டறிக: அ. z வழி ஒளிவினை நிகழ்வில் பங்கு பெறுவது PS I மட்டும், ஆ . சுழல் ஒளிபாஸ்பரிகரணத்தில் PS I மட்டும் பங்கேற்கிறது, இ.  சுழல் ஒளிபாஸ்பரிகரணத்தில் ATP மற்றும் NADPH2 உருவாகிறது, ஈ. ஸ்ட்ரோமா லாமெல்லாக்களில் PS II மற்றும் NADP காணப்படுவதில்லை </a:t>
-            </a:r>
-          </a:p>
-          <a:p>
-            <a:endParaRPr/>
-          </a:p>
-          <a:p>
-            <a:r>
+              <a:rPr dirty="0"/>
+              <a:t>Q - 31  </a:t>
+            </a:r>
+            <a:r>
+              <a:rPr dirty="0" err="1"/>
+              <a:t>கீழ்க்கண்ட</a:t>
+            </a:r>
+            <a:r>
+              <a:rPr dirty="0"/>
+              <a:t> </a:t>
+            </a:r>
+            <a:r>
+              <a:rPr dirty="0" err="1"/>
+              <a:t>நான்கு</a:t>
+            </a:r>
+            <a:r>
+              <a:rPr dirty="0"/>
+              <a:t> </a:t>
+            </a:r>
+            <a:r>
+              <a:rPr dirty="0" err="1"/>
+              <a:t>கூற்றுகளில்</a:t>
+            </a:r>
+            <a:r>
+              <a:rPr dirty="0"/>
+              <a:t> </a:t>
+            </a:r>
+            <a:r>
+              <a:rPr dirty="0" err="1"/>
+              <a:t>எது</a:t>
+            </a:r>
+            <a:r>
+              <a:rPr dirty="0"/>
+              <a:t> </a:t>
+            </a:r>
+            <a:r>
+              <a:rPr dirty="0" err="1"/>
+              <a:t>சரியானது</a:t>
+            </a:r>
+            <a:r>
+              <a:rPr dirty="0"/>
+              <a:t> </a:t>
+            </a:r>
+            <a:r>
+              <a:rPr dirty="0" err="1"/>
+              <a:t>என</a:t>
+            </a:r>
+            <a:r>
+              <a:rPr dirty="0"/>
+              <a:t> </a:t>
+            </a:r>
+            <a:r>
+              <a:rPr dirty="0" err="1"/>
+              <a:t>கண்டறிக</a:t>
+            </a:r>
+            <a:r>
+              <a:rPr dirty="0"/>
+              <a:t>: அ. z </a:t>
+            </a:r>
+            <a:r>
+              <a:rPr dirty="0" err="1"/>
+              <a:t>வழி</a:t>
+            </a:r>
+            <a:r>
+              <a:rPr dirty="0"/>
+              <a:t> </a:t>
+            </a:r>
+            <a:r>
+              <a:rPr dirty="0" err="1"/>
+              <a:t>ஒளிவினை</a:t>
+            </a:r>
+            <a:r>
+              <a:rPr dirty="0"/>
+              <a:t> </a:t>
+            </a:r>
+            <a:r>
+              <a:rPr dirty="0" err="1"/>
+              <a:t>நிகழ்வில்</a:t>
+            </a:r>
+            <a:r>
+              <a:rPr dirty="0"/>
+              <a:t> </a:t>
+            </a:r>
+            <a:r>
+              <a:rPr dirty="0" err="1"/>
+              <a:t>பங்கு</a:t>
+            </a:r>
+            <a:r>
+              <a:rPr dirty="0"/>
+              <a:t> </a:t>
+            </a:r>
+            <a:r>
+              <a:rPr dirty="0" err="1"/>
+              <a:t>பெறுவது</a:t>
+            </a:r>
+            <a:r>
+              <a:rPr dirty="0"/>
+              <a:t> PS I </a:t>
+            </a:r>
+            <a:r>
+              <a:rPr dirty="0" err="1"/>
+              <a:t>மட்டும்</a:t>
+            </a:r>
+            <a:r>
+              <a:rPr dirty="0"/>
+              <a:t>, ஆ . </a:t>
+            </a:r>
+            <a:r>
+              <a:rPr dirty="0" err="1"/>
+              <a:t>சுழல்</a:t>
+            </a:r>
+            <a:r>
+              <a:rPr dirty="0"/>
+              <a:t> </a:t>
+            </a:r>
+            <a:r>
+              <a:rPr dirty="0" err="1"/>
+              <a:t>ஒளிபாஸ்பரிகரணத்தில்</a:t>
+            </a:r>
+            <a:r>
+              <a:rPr dirty="0"/>
+              <a:t> PS I </a:t>
+            </a:r>
+            <a:r>
+              <a:rPr dirty="0" err="1"/>
+              <a:t>மட்டும்</a:t>
+            </a:r>
+            <a:r>
+              <a:rPr dirty="0"/>
+              <a:t> </a:t>
+            </a:r>
+            <a:r>
+              <a:rPr dirty="0" err="1"/>
+              <a:t>பங்கேற்கிறது</a:t>
+            </a:r>
+            <a:r>
+              <a:rPr dirty="0"/>
+              <a:t>, இ.  </a:t>
+            </a:r>
+            <a:r>
+              <a:rPr dirty="0" err="1"/>
+              <a:t>சுழல்</a:t>
+            </a:r>
+            <a:r>
+              <a:rPr dirty="0"/>
+              <a:t> </a:t>
+            </a:r>
+            <a:r>
+              <a:rPr dirty="0" err="1"/>
+              <a:t>ஒளிபாஸ்பரிகரணத்தில்</a:t>
+            </a:r>
+            <a:r>
+              <a:rPr dirty="0"/>
+              <a:t> ATP </a:t>
+            </a:r>
+            <a:r>
+              <a:rPr dirty="0" err="1"/>
+              <a:t>மற்றும்</a:t>
+            </a:r>
+            <a:r>
+              <a:rPr dirty="0"/>
+              <a:t> NADPH2 </a:t>
+            </a:r>
+            <a:r>
+              <a:rPr dirty="0" err="1"/>
+              <a:t>உருவாகிறது</a:t>
+            </a:r>
+            <a:r>
+              <a:rPr dirty="0"/>
+              <a:t>, ஈ. </a:t>
+            </a:r>
+            <a:r>
+              <a:rPr dirty="0" err="1"/>
+              <a:t>ஸ்ட்ரோமா</a:t>
+            </a:r>
+            <a:r>
+              <a:rPr dirty="0"/>
+              <a:t> </a:t>
+            </a:r>
+            <a:r>
+              <a:rPr dirty="0" err="1"/>
+              <a:t>லாமெல்லாக்களில்</a:t>
+            </a:r>
+            <a:r>
+              <a:rPr dirty="0"/>
+              <a:t> PS II </a:t>
+            </a:r>
+            <a:r>
+              <a:rPr dirty="0" err="1"/>
+              <a:t>மற்றும்</a:t>
+            </a:r>
+            <a:r>
+              <a:rPr dirty="0"/>
+              <a:t> NADP </a:t>
+            </a:r>
+            <a:r>
+              <a:rPr dirty="0" err="1"/>
+              <a:t>காணப்படுவதில்லை</a:t>
+            </a:r>
+            <a:r>
+              <a:rPr dirty="0"/>
+              <a:t> </a:t>
+            </a:r>
+          </a:p>
+          <a:p>
+            <a:endParaRPr dirty="0"/>
+          </a:p>
+          <a:p>
+            <a:r>
+              <a:rPr dirty="0"/>
               <a:t>AIPMT - 2010</a:t>
             </a:r>
           </a:p>
           <a:p>
-            <a:endParaRPr/>
-          </a:p>
-          <a:p>
-            <a:r>
-              <a:t>அ) அ மற்றும் ஆ</a:t>
-            </a:r>
-          </a:p>
-          <a:p>
-            <a:endParaRPr/>
-          </a:p>
-          <a:p>
-            <a:r>
-              <a:t>ஆ) ஆ மற்றும் இ</a:t>
-            </a:r>
-          </a:p>
-          <a:p>
-            <a:endParaRPr/>
-          </a:p>
-          <a:p>
-            <a:r>
-              <a:t>இ) இ மற்றும்  ஈ</a:t>
-            </a:r>
-          </a:p>
-          <a:p>
-            <a:endParaRPr/>
-          </a:p>
-          <a:p>
-            <a:r>
-              <a:t>ஈ) ஆ மற்றும்  ஈ</a:t>
+            <a:endParaRPr dirty="0"/>
+          </a:p>
+          <a:p>
+            <a:r>
+              <a:rPr dirty="0"/>
+              <a:t>அ) அ </a:t>
+            </a:r>
+            <a:r>
+              <a:rPr dirty="0" err="1"/>
+              <a:t>மற்றும்</a:t>
+            </a:r>
+            <a:r>
+              <a:rPr dirty="0"/>
+              <a:t> ஆ</a:t>
+            </a:r>
+          </a:p>
+          <a:p>
+            <a:endParaRPr dirty="0"/>
+          </a:p>
+          <a:p>
+            <a:r>
+              <a:rPr dirty="0"/>
+              <a:t>ஆ) ஆ </a:t>
+            </a:r>
+            <a:r>
+              <a:rPr dirty="0" err="1"/>
+              <a:t>மற்றும்</a:t>
+            </a:r>
+            <a:r>
+              <a:rPr dirty="0"/>
+              <a:t> இ</a:t>
+            </a:r>
+          </a:p>
+          <a:p>
+            <a:endParaRPr dirty="0"/>
+          </a:p>
+          <a:p>
+            <a:r>
+              <a:rPr dirty="0"/>
+              <a:t>இ) இ </a:t>
+            </a:r>
+            <a:r>
+              <a:rPr dirty="0" err="1"/>
+              <a:t>மற்றும்</a:t>
+            </a:r>
+            <a:r>
+              <a:rPr dirty="0"/>
+              <a:t>  ஈ</a:t>
+            </a:r>
+          </a:p>
+          <a:p>
+            <a:endParaRPr dirty="0"/>
+          </a:p>
+          <a:p>
+            <a:r>
+              <a:rPr dirty="0"/>
+              <a:t>ஈ) ஆ </a:t>
+            </a:r>
+            <a:r>
+              <a:rPr dirty="0" err="1"/>
+              <a:t>மற்றும்</a:t>
+            </a:r>
+            <a:r>
+              <a:rPr dirty="0"/>
+              <a:t>  ஈ</a:t>
             </a:r>
           </a:p>
         </p:txBody>
@@ -18064,7 +19573,7 @@
         </p:nvSpPr>
         <p:spPr>
           <a:xfrm>
-            <a:off x="457200" y="1371600"/>
+            <a:off x="457200" y="839755"/>
             <a:ext cx="7315200" cy="3657600"/>
           </a:xfrm>
           <a:prstGeom prst="rect">
@@ -18078,7 +19587,7 @@
           </a:bodyPr>
           <a:lstStyle/>
           <a:p>
-            <a:endParaRPr/>
+            <a:endParaRPr dirty="0"/>
           </a:p>
           <a:p>
             <a:pPr>
@@ -18090,19 +19599,221 @@
               </a:defRPr>
             </a:pPr>
             <a:r>
-              <a:t>Q - 31  கீழ்க்கண்ட நான்கு கூற்றுகளில் எது சரியானது என கண்டறிக: அ. z வழி ஒளிவினை நிகழ்வில் பங்கு பெறுவது PS I மட்டும், ஆ . சுழல் ஒளிபாஸ்பரிகரணத்தில் PS I மட்டும் பங்கேற்கிறது, இ.  சுழல் ஒளிபாஸ்பரிகரணத்தில் ATP மற்றும் NADPH2 உருவாகிறது, ஈ. ஸ்ட்ரோமா லாமெல்லாக்களில் PS II மற்றும் NADP காணப்படுவதில்லை </a:t>
-            </a:r>
-          </a:p>
-          <a:p>
-            <a:endParaRPr/>
-          </a:p>
-          <a:p>
-            <a:r>
+              <a:rPr dirty="0"/>
+              <a:t>Q - 31  </a:t>
+            </a:r>
+            <a:r>
+              <a:rPr dirty="0" err="1"/>
+              <a:t>கீழ்க்கண்ட</a:t>
+            </a:r>
+            <a:r>
+              <a:rPr dirty="0"/>
+              <a:t> </a:t>
+            </a:r>
+            <a:r>
+              <a:rPr dirty="0" err="1"/>
+              <a:t>நான்கு</a:t>
+            </a:r>
+            <a:r>
+              <a:rPr dirty="0"/>
+              <a:t> </a:t>
+            </a:r>
+            <a:r>
+              <a:rPr dirty="0" err="1"/>
+              <a:t>கூற்றுகளில்</a:t>
+            </a:r>
+            <a:r>
+              <a:rPr dirty="0"/>
+              <a:t> </a:t>
+            </a:r>
+            <a:r>
+              <a:rPr dirty="0" err="1"/>
+              <a:t>எது</a:t>
+            </a:r>
+            <a:r>
+              <a:rPr dirty="0"/>
+              <a:t> </a:t>
+            </a:r>
+            <a:r>
+              <a:rPr dirty="0" err="1"/>
+              <a:t>சரியானது</a:t>
+            </a:r>
+            <a:r>
+              <a:rPr dirty="0"/>
+              <a:t> </a:t>
+            </a:r>
+            <a:r>
+              <a:rPr dirty="0" err="1"/>
+              <a:t>என</a:t>
+            </a:r>
+            <a:r>
+              <a:rPr dirty="0"/>
+              <a:t> </a:t>
+            </a:r>
+            <a:r>
+              <a:rPr dirty="0" err="1"/>
+              <a:t>கண்டறிக</a:t>
+            </a:r>
+            <a:r>
+              <a:rPr dirty="0"/>
+              <a:t>: அ. z </a:t>
+            </a:r>
+            <a:r>
+              <a:rPr dirty="0" err="1"/>
+              <a:t>வழி</a:t>
+            </a:r>
+            <a:r>
+              <a:rPr dirty="0"/>
+              <a:t> </a:t>
+            </a:r>
+            <a:r>
+              <a:rPr dirty="0" err="1"/>
+              <a:t>ஒளிவினை</a:t>
+            </a:r>
+            <a:r>
+              <a:rPr dirty="0"/>
+              <a:t> </a:t>
+            </a:r>
+            <a:r>
+              <a:rPr dirty="0" err="1"/>
+              <a:t>நிகழ்வில்</a:t>
+            </a:r>
+            <a:r>
+              <a:rPr dirty="0"/>
+              <a:t> </a:t>
+            </a:r>
+            <a:r>
+              <a:rPr dirty="0" err="1"/>
+              <a:t>பங்கு</a:t>
+            </a:r>
+            <a:r>
+              <a:rPr dirty="0"/>
+              <a:t> </a:t>
+            </a:r>
+            <a:r>
+              <a:rPr dirty="0" err="1"/>
+              <a:t>பெறுவது</a:t>
+            </a:r>
+            <a:r>
+              <a:rPr dirty="0"/>
+              <a:t> PS I </a:t>
+            </a:r>
+            <a:r>
+              <a:rPr dirty="0" err="1"/>
+              <a:t>மட்டும்</a:t>
+            </a:r>
+            <a:r>
+              <a:rPr dirty="0"/>
+              <a:t>, ஆ . </a:t>
+            </a:r>
+            <a:r>
+              <a:rPr dirty="0" err="1"/>
+              <a:t>சுழல்</a:t>
+            </a:r>
+            <a:r>
+              <a:rPr dirty="0"/>
+              <a:t> </a:t>
+            </a:r>
+            <a:r>
+              <a:rPr dirty="0" err="1"/>
+              <a:t>ஒளிபாஸ்பரிகரணத்தில்</a:t>
+            </a:r>
+            <a:r>
+              <a:rPr dirty="0"/>
+              <a:t> PS I </a:t>
+            </a:r>
+            <a:r>
+              <a:rPr dirty="0" err="1"/>
+              <a:t>மட்டும்</a:t>
+            </a:r>
+            <a:r>
+              <a:rPr dirty="0"/>
+              <a:t> </a:t>
+            </a:r>
+            <a:r>
+              <a:rPr dirty="0" err="1"/>
+              <a:t>பங்கேற்கிறது</a:t>
+            </a:r>
+            <a:r>
+              <a:rPr dirty="0"/>
+              <a:t>, இ.  </a:t>
+            </a:r>
+            <a:r>
+              <a:rPr dirty="0" err="1"/>
+              <a:t>சுழல்</a:t>
+            </a:r>
+            <a:r>
+              <a:rPr dirty="0"/>
+              <a:t> </a:t>
+            </a:r>
+            <a:r>
+              <a:rPr dirty="0" err="1"/>
+              <a:t>ஒளிபாஸ்பரிகரணத்தில்</a:t>
+            </a:r>
+            <a:r>
+              <a:rPr dirty="0"/>
+              <a:t> ATP </a:t>
+            </a:r>
+            <a:r>
+              <a:rPr dirty="0" err="1"/>
+              <a:t>மற்றும்</a:t>
+            </a:r>
+            <a:r>
+              <a:rPr dirty="0"/>
+              <a:t> NADPH2 </a:t>
+            </a:r>
+            <a:r>
+              <a:rPr dirty="0" err="1"/>
+              <a:t>உருவாகிறது</a:t>
+            </a:r>
+            <a:r>
+              <a:rPr dirty="0"/>
+              <a:t>, ஈ. </a:t>
+            </a:r>
+            <a:r>
+              <a:rPr dirty="0" err="1"/>
+              <a:t>ஸ்ட்ரோமா</a:t>
+            </a:r>
+            <a:r>
+              <a:rPr dirty="0"/>
+              <a:t> </a:t>
+            </a:r>
+            <a:r>
+              <a:rPr dirty="0" err="1"/>
+              <a:t>லாமெல்லாக்களில்</a:t>
+            </a:r>
+            <a:r>
+              <a:rPr dirty="0"/>
+              <a:t> PS II </a:t>
+            </a:r>
+            <a:r>
+              <a:rPr dirty="0" err="1"/>
+              <a:t>மற்றும்</a:t>
+            </a:r>
+            <a:r>
+              <a:rPr dirty="0"/>
+              <a:t> NADP </a:t>
+            </a:r>
+            <a:r>
+              <a:rPr dirty="0" err="1"/>
+              <a:t>காணப்படுவதில்லை</a:t>
+            </a:r>
+            <a:r>
+              <a:rPr dirty="0"/>
+              <a:t> </a:t>
+            </a:r>
+          </a:p>
+          <a:p>
+            <a:endParaRPr dirty="0"/>
+          </a:p>
+          <a:p>
+            <a:r>
+              <a:rPr dirty="0"/>
               <a:t>AIPMT - 2010</a:t>
             </a:r>
           </a:p>
           <a:p>
-            <a:endParaRPr/>
+            <a:endParaRPr dirty="0"/>
           </a:p>
           <a:p>
             <a:pPr>
@@ -18114,7 +19825,16 @@
               </a:defRPr>
             </a:pPr>
             <a:r>
-              <a:t>ஈ) ஆ மற்றும்  ஈ</a:t>
+              <a:rPr dirty="0"/>
+              <a:t>ஈ) ஆ </a:t>
+            </a:r>
+            <a:r>
+              <a:rPr dirty="0" err="1"/>
+              <a:t>மற்றும்</a:t>
+            </a:r>
+            <a:r>
+              <a:rPr dirty="0"/>
+              <a:t>  ஈ</a:t>
             </a:r>
           </a:p>
         </p:txBody>
@@ -18925,7 +20645,7 @@
           </a:bodyPr>
           <a:lstStyle/>
           <a:p>
-            <a:endParaRPr/>
+            <a:endParaRPr dirty="0"/>
           </a:p>
           <a:p>
             <a:pPr>
@@ -18937,47 +20657,117 @@
               </a:defRPr>
             </a:pPr>
             <a:r>
-              <a:t>Q - 34  பாஸ்போ ஈனால் பைருவேட் (PEP) முதன்மை CO2 ஏற்பியாக செயல்படுவது. தாவரம் </a:t>
-            </a:r>
-          </a:p>
-          <a:p>
-            <a:endParaRPr/>
-          </a:p>
-          <a:p>
-            <a:r>
+              <a:rPr dirty="0"/>
+              <a:t>Q - 34  </a:t>
+            </a:r>
+            <a:r>
+              <a:rPr dirty="0" err="1"/>
+              <a:t>பாஸ்போ</a:t>
+            </a:r>
+            <a:r>
+              <a:rPr dirty="0"/>
+              <a:t> </a:t>
+            </a:r>
+            <a:r>
+              <a:rPr dirty="0" err="1"/>
+              <a:t>ஈனால்</a:t>
+            </a:r>
+            <a:r>
+              <a:rPr dirty="0"/>
+              <a:t> </a:t>
+            </a:r>
+            <a:r>
+              <a:rPr dirty="0" err="1"/>
+              <a:t>பைருவேட்</a:t>
+            </a:r>
+            <a:r>
+              <a:rPr dirty="0"/>
+              <a:t> (PEP) </a:t>
+            </a:r>
+            <a:r>
+              <a:rPr dirty="0" err="1"/>
+              <a:t>முதன்மை</a:t>
+            </a:r>
+            <a:r>
+              <a:rPr dirty="0"/>
+              <a:t> CO2 </a:t>
+            </a:r>
+            <a:r>
+              <a:rPr dirty="0" err="1"/>
+              <a:t>ஏற்பியாக</a:t>
+            </a:r>
+            <a:r>
+              <a:rPr dirty="0"/>
+              <a:t> </a:t>
+            </a:r>
+            <a:r>
+              <a:rPr dirty="0" err="1"/>
+              <a:t>செயல்படுவது</a:t>
+            </a:r>
+            <a:r>
+              <a:rPr dirty="0"/>
+              <a:t>. </a:t>
+            </a:r>
+            <a:r>
+              <a:rPr dirty="0" err="1"/>
+              <a:t>தாவரம்</a:t>
+            </a:r>
+            <a:r>
+              <a:rPr dirty="0"/>
+              <a:t> </a:t>
+            </a:r>
+          </a:p>
+          <a:p>
+            <a:endParaRPr dirty="0"/>
+          </a:p>
+          <a:p>
+            <a:r>
+              <a:rPr dirty="0"/>
               <a:t>NEET - 2017</a:t>
             </a:r>
           </a:p>
           <a:p>
-            <a:endParaRPr/>
-          </a:p>
-          <a:p>
-            <a:r>
+            <a:endParaRPr dirty="0"/>
+          </a:p>
+          <a:p>
+            <a:r>
+              <a:rPr dirty="0"/>
               <a:t>அ) C3</a:t>
             </a:r>
           </a:p>
           <a:p>
-            <a:endParaRPr/>
-          </a:p>
-          <a:p>
-            <a:r>
+            <a:endParaRPr dirty="0"/>
+          </a:p>
+          <a:p>
+            <a:r>
+              <a:rPr dirty="0"/>
               <a:t>ஆ) C4</a:t>
             </a:r>
           </a:p>
           <a:p>
-            <a:endParaRPr/>
-          </a:p>
-          <a:p>
-            <a:r>
+            <a:endParaRPr dirty="0"/>
+          </a:p>
+          <a:p>
+            <a:r>
+              <a:rPr dirty="0"/>
               <a:t>இ) C2</a:t>
             </a:r>
           </a:p>
           <a:p>
-            <a:endParaRPr/>
-          </a:p>
-          <a:p>
-            <a:r>
-              <a:t>ஈ) C3 மற்றும் C4</a:t>
+            <a:endParaRPr dirty="0"/>
+          </a:p>
+          <a:p>
+            <a:r>
+              <a:rPr dirty="0"/>
+              <a:t>ஈ) C3 </a:t>
+            </a:r>
+            <a:r>
+              <a:rPr dirty="0" err="1"/>
+              <a:t>மற்றும்</a:t>
+            </a:r>
+            <a:r>
+              <a:rPr dirty="0"/>
+              <a:t> C4</a:t>
             </a:r>
           </a:p>
         </p:txBody>
@@ -21331,7 +23121,7 @@
               </a:defRPr>
             </a:pPr>
             <a:r>
-              <a:t>Q - 40  ஆக்ஸிஜனேற்ற பாஸ்பரிகரணம் என்பது </a:t>
+              <a:t>Q - 40  ஆக்ஸிஜனேற்ற பாஸ்பரிகரணம் என்பது என்ன?</a:t>
             </a:r>
           </a:p>
           <a:p>
@@ -21510,7 +23300,7 @@
               </a:defRPr>
             </a:pPr>
             <a:r>
-              <a:t>Q - 40  ஆக்ஸிஜனேற்ற பாஸ்பரிகரணம் என்பது </a:t>
+              <a:t>Q - 40  ஆக்ஸிஜனேற்ற பாஸ்பரிகரணம் என்பது என்ன?</a:t>
             </a:r>
           </a:p>
           <a:p>
@@ -22331,8 +24121,8 @@
         </p:nvSpPr>
         <p:spPr>
           <a:xfrm>
-            <a:off x="457200" y="1371600"/>
-            <a:ext cx="7315200" cy="3657600"/>
+            <a:off x="457200" y="741784"/>
+            <a:ext cx="7315200" cy="4985980"/>
           </a:xfrm>
           <a:prstGeom prst="rect">
             <a:avLst/>
@@ -22480,10 +24270,7 @@
               <a:rPr dirty="0" err="1"/>
               <a:t>குறிக்கிறது</a:t>
             </a:r>
-            <a:r>
-              <a:rPr dirty="0"/>
-              <a:t>.</a:t>
-            </a:r>
+            <a:endParaRPr dirty="0"/>
           </a:p>
           <a:p>
             <a:endParaRPr dirty="0"/>
@@ -22573,7 +24360,7 @@
           <p:cNvPr id="6" name="Picture 5">
             <a:extLst>
               <a:ext uri="{FF2B5EF4-FFF2-40B4-BE49-F238E27FC236}">
-                <a16:creationId xmlns:a16="http://schemas.microsoft.com/office/drawing/2014/main" id="{3E480EB6-3D90-4317-AFBC-645EA1DC35CE}"/>
+                <a16:creationId xmlns:a16="http://schemas.microsoft.com/office/drawing/2014/main" id="{3F8EC624-26BD-456C-B24B-753163C0A41E}"/>
               </a:ext>
             </a:extLst>
           </p:cNvPr>
@@ -22590,8 +24377,8 @@
         </p:blipFill>
         <p:spPr>
           <a:xfrm>
-            <a:off x="3321698" y="3506056"/>
-            <a:ext cx="5822302" cy="2894744"/>
+            <a:off x="3420253" y="2618954"/>
+            <a:ext cx="5037947" cy="2777574"/>
           </a:xfrm>
           <a:prstGeom prst="rect">
             <a:avLst/>
@@ -22678,7 +24465,7 @@
         </p:nvSpPr>
         <p:spPr>
           <a:xfrm>
-            <a:off x="457200" y="1371600"/>
+            <a:off x="457200" y="849086"/>
             <a:ext cx="7315200" cy="3657600"/>
           </a:xfrm>
           <a:prstGeom prst="rect">
@@ -22692,7 +24479,7 @@
           </a:bodyPr>
           <a:lstStyle/>
           <a:p>
-            <a:endParaRPr/>
+            <a:endParaRPr dirty="0"/>
           </a:p>
           <a:p>
             <a:pPr>
@@ -22704,35 +24491,145 @@
               </a:defRPr>
             </a:pPr>
             <a:r>
-              <a:t>Q - 43  காற்று  சுவாசித்தலின்போது இந்த வரைபடத்தில்</a:t>
-            </a:r>
-            <a:br/>
-            <a:r>
-              <a:t>உள்ள பெட்டியானது மூன்று முக்கிய</a:t>
-            </a:r>
-            <a:br/>
-            <a:r>
-              <a:t>உயிரிவழித்தடத்தினை குறிக்கிறது மற்றும்</a:t>
-            </a:r>
-            <a:br/>
-            <a:r>
-              <a:t>அம்புக்குறி நிகரவினை அல்லது விளைபொருளை</a:t>
-            </a:r>
-            <a:br/>
-            <a:r>
-              <a:t>குறிக்கிறது.</a:t>
-            </a:r>
-          </a:p>
-          <a:p>
-            <a:endParaRPr/>
-          </a:p>
-          <a:p>
-            <a:r>
+              <a:rPr dirty="0"/>
+              <a:t>Q - 43  </a:t>
+            </a:r>
+            <a:r>
+              <a:rPr dirty="0" err="1"/>
+              <a:t>காற்று</a:t>
+            </a:r>
+            <a:r>
+              <a:rPr dirty="0"/>
+              <a:t>  </a:t>
+            </a:r>
+            <a:r>
+              <a:rPr dirty="0" err="1"/>
+              <a:t>சுவாசித்தலின்போது</a:t>
+            </a:r>
+            <a:r>
+              <a:rPr dirty="0"/>
+              <a:t> </a:t>
+            </a:r>
+            <a:r>
+              <a:rPr dirty="0" err="1"/>
+              <a:t>இந்த</a:t>
+            </a:r>
+            <a:r>
+              <a:rPr dirty="0"/>
+              <a:t> </a:t>
+            </a:r>
+            <a:r>
+              <a:rPr dirty="0" err="1"/>
+              <a:t>வரைபடத்தில்</a:t>
+            </a:r>
+            <a:br>
+              <a:rPr dirty="0"/>
+            </a:br>
+            <a:r>
+              <a:rPr dirty="0" err="1"/>
+              <a:t>உள்ள</a:t>
+            </a:r>
+            <a:r>
+              <a:rPr dirty="0"/>
+              <a:t> </a:t>
+            </a:r>
+            <a:r>
+              <a:rPr dirty="0" err="1"/>
+              <a:t>பெட்டியானது</a:t>
+            </a:r>
+            <a:r>
+              <a:rPr dirty="0"/>
+              <a:t> </a:t>
+            </a:r>
+            <a:r>
+              <a:rPr dirty="0" err="1"/>
+              <a:t>மூன்று</a:t>
+            </a:r>
+            <a:r>
+              <a:rPr dirty="0"/>
+              <a:t> </a:t>
+            </a:r>
+            <a:r>
+              <a:rPr dirty="0" err="1"/>
+              <a:t>முக்கிய</a:t>
+            </a:r>
+            <a:br>
+              <a:rPr dirty="0"/>
+            </a:br>
+            <a:r>
+              <a:rPr dirty="0" err="1"/>
+              <a:t>உயிரிவழித்தடத்தினை</a:t>
+            </a:r>
+            <a:r>
+              <a:rPr dirty="0"/>
+              <a:t> </a:t>
+            </a:r>
+            <a:r>
+              <a:rPr dirty="0" err="1"/>
+              <a:t>குறிக்கிறது</a:t>
+            </a:r>
+            <a:r>
+              <a:rPr dirty="0"/>
+              <a:t> </a:t>
+            </a:r>
+            <a:r>
+              <a:rPr dirty="0" err="1"/>
+              <a:t>மற்றும்</a:t>
+            </a:r>
+            <a:br>
+              <a:rPr dirty="0"/>
+            </a:br>
+            <a:r>
+              <a:rPr dirty="0" err="1"/>
+              <a:t>அம்புக்குறி</a:t>
+            </a:r>
+            <a:r>
+              <a:rPr dirty="0"/>
+              <a:t> </a:t>
+            </a:r>
+            <a:r>
+              <a:rPr dirty="0" err="1"/>
+              <a:t>நிகரவினை</a:t>
+            </a:r>
+            <a:r>
+              <a:rPr dirty="0"/>
+              <a:t> </a:t>
+            </a:r>
+            <a:r>
+              <a:rPr dirty="0" err="1"/>
+              <a:t>அல்லது</a:t>
+            </a:r>
+            <a:r>
+              <a:rPr dirty="0"/>
+              <a:t> </a:t>
+            </a:r>
+            <a:r>
+              <a:rPr dirty="0" err="1"/>
+              <a:t>விளைபொருளை</a:t>
+            </a:r>
+            <a:br>
+              <a:rPr dirty="0"/>
+            </a:br>
+            <a:r>
+              <a:rPr dirty="0" err="1"/>
+              <a:t>குறிக்கிறது</a:t>
+            </a:r>
+            <a:r>
+              <a:rPr dirty="0"/>
+              <a:t>.</a:t>
+            </a:r>
+          </a:p>
+          <a:p>
+            <a:endParaRPr dirty="0"/>
+          </a:p>
+          <a:p>
+            <a:r>
+              <a:rPr dirty="0"/>
               <a:t>NEET - 2013</a:t>
             </a:r>
           </a:p>
           <a:p>
-            <a:endParaRPr/>
+            <a:endParaRPr dirty="0"/>
           </a:p>
           <a:p>
             <a:pPr>
@@ -22744,6 +24641,7 @@
               </a:defRPr>
             </a:pPr>
             <a:r>
+              <a:rPr dirty="0"/>
               <a:t>அ) ATP</a:t>
             </a:r>
           </a:p>
@@ -22782,7 +24680,7 @@
           <p:cNvPr id="6" name="Picture 5">
             <a:extLst>
               <a:ext uri="{FF2B5EF4-FFF2-40B4-BE49-F238E27FC236}">
-                <a16:creationId xmlns:a16="http://schemas.microsoft.com/office/drawing/2014/main" id="{A4D8E085-105C-447D-812C-E733DDDB2D42}"/>
+                <a16:creationId xmlns:a16="http://schemas.microsoft.com/office/drawing/2014/main" id="{8E3F7D26-637E-4EAD-813B-B8B0379BFC29}"/>
               </a:ext>
             </a:extLst>
           </p:cNvPr>
@@ -22799,8 +24697,8 @@
         </p:blipFill>
         <p:spPr>
           <a:xfrm>
-            <a:off x="3321698" y="3506056"/>
-            <a:ext cx="5822302" cy="2894744"/>
+            <a:off x="2571168" y="2677886"/>
+            <a:ext cx="5037947" cy="2777574"/>
           </a:xfrm>
           <a:prstGeom prst="rect">
             <a:avLst/>
@@ -23760,7 +25658,7 @@
               </a:defRPr>
             </a:pPr>
             <a:r>
-              <a:t>Q - 46  சுவாசித்தல் என்ற வினையில் </a:t>
+              <a:t>Q - 46  சுவாசித்தல் என்ற வினையில் என்ன நிகழ்கிறது?</a:t>
             </a:r>
           </a:p>
           <a:p>
@@ -23792,7 +25690,7 @@
           </a:p>
           <a:p>
             <a:r>
-              <a:t>இ) ஆற்றல் TP வடிவத்தில் வெளியிடப்படுகிறது மற்றும் சேமிக்கப்படுகிறது </a:t>
+              <a:t>இ) ஆற்றல் ATP வடிவத்தில் வெளியிடப்படுகிறது மற்றும் சேமிக்கப்படுகிறது </a:t>
             </a:r>
           </a:p>
           <a:p>
@@ -23939,7 +25837,7 @@
               </a:defRPr>
             </a:pPr>
             <a:r>
-              <a:t>Q - 46  சுவாசித்தல் என்ற வினையில் </a:t>
+              <a:t>Q - 46  சுவாசித்தல் என்ற வினையில் என்ன நிகழ்கிறது?</a:t>
             </a:r>
           </a:p>
           <a:p>
@@ -23963,7 +25861,7 @@
               </a:defRPr>
             </a:pPr>
             <a:r>
-              <a:t>இ) ஆற்றல் TP வடிவத்தில் வெளியிடப்படுகிறது மற்றும் சேமிக்கப்படுகிறது </a:t>
+              <a:t>இ) ஆற்றல் ATP வடிவத்தில் வெளியிடப்படுகிறது மற்றும் சேமிக்கப்படுகிறது </a:t>
             </a:r>
           </a:p>
         </p:txBody>
@@ -24102,7 +26000,7 @@
               </a:defRPr>
             </a:pPr>
             <a:r>
-              <a:t>Q - 47  காற்று மற்றும் காற்றிலா சுவாசித்தலில் பொதுவான நிலை எனப்படுவது </a:t>
+              <a:t>Q - 47  காற்று மற்றும் காற்றிலா சுவாசித்தலில் பொதுவான நிலை எனப்படுவது?</a:t>
             </a:r>
           </a:p>
           <a:p>
@@ -24281,7 +26179,7 @@
               </a:defRPr>
             </a:pPr>
             <a:r>
-              <a:t>Q - 47  காற்று மற்றும் காற்றிலா சுவாசித்தலில் பொதுவான நிலை எனப்படுவது </a:t>
+              <a:t>Q - 47  காற்று மற்றும் காற்றிலா சுவாசித்தலில் பொதுவான நிலை எனப்படுவது?</a:t>
             </a:r>
           </a:p>
           <a:p>
@@ -24444,7 +26342,7 @@
               </a:defRPr>
             </a:pPr>
             <a:r>
-              <a:t>Q - 48  ATP உற்பத்திநடைபெறுகிறது </a:t>
+              <a:t>Q - 48  ATP உற்பத்தி எங்கு நடைபெறுகிறது?</a:t>
             </a:r>
           </a:p>
           <a:p>
@@ -24623,7 +26521,7 @@
               </a:defRPr>
             </a:pPr>
             <a:r>
-              <a:t>Q - 48  ATP உற்பத்திநடைபெறுகிறது </a:t>
+              <a:t>Q - 48  ATP உற்பத்தி எங்கு நடைபெறுகிறது?</a:t>
             </a:r>
           </a:p>
           <a:p>
@@ -24786,7 +26684,7 @@
               </a:defRPr>
             </a:pPr>
             <a:r>
-              <a:t>Q - 49  கிரப்ஸ் சுழற்சியில் உள்ள எந்த 5-கார்பன் கரிமசேர்மம் N2 வளர்சிதை மாற்றத்தில் முக்கிய சேர்மமாக உள்ளது </a:t>
+              <a:t>Q - 49  கிரப்ஸ் சுழற்சியில் உள்ள எந்த 5-கார்பன் கரிமசேர்மம் N2 வளர்சிதை மாற்றத்தில் முக்கிய சேர்மமாக உள்ளது?</a:t>
             </a:r>
           </a:p>
           <a:p>
@@ -24965,7 +26863,7 @@
               </a:defRPr>
             </a:pPr>
             <a:r>
-              <a:t>Q - 49  கிரப்ஸ் சுழற்சியில் உள்ள எந்த 5-கார்பன் கரிமசேர்மம் N2 வளர்சிதை மாற்றத்தில் முக்கிய சேர்மமாக உள்ளது </a:t>
+              <a:t>Q - 49  கிரப்ஸ் சுழற்சியில் உள்ள எந்த 5-கார்பன் கரிமசேர்மம் N2 வளர்சிதை மாற்றத்தில் முக்கிய சேர்மமாக உள்ளது?</a:t>
             </a:r>
           </a:p>
           <a:p>

</xml_diff>

<commit_message>
unit 05 plant physiology fixes
</commit_message>
<xml_diff>
--- a/neet/tamil_biology/files/unit_05_plant_physiology.pptx
+++ b/neet/tamil_biology/files/unit_05_plant_physiology.pptx
@@ -9417,7 +9417,7 @@
         <p:spPr>
           <a:xfrm>
             <a:off x="457200" y="1371600"/>
-            <a:ext cx="7315200" cy="3385542"/>
+            <a:ext cx="7315200" cy="3631763"/>
           </a:xfrm>
           <a:prstGeom prst="rect">
             <a:avLst/>
@@ -9447,7 +9447,15 @@
             </a:r>
             <a:r>
               <a:rPr lang="ta-IN" sz="1600" dirty="0"/>
-              <a:t>தாவரங்களின் வளர்ச்சி வளைவின் வடிவம் என்ன?</a:t>
+              <a:t>தாவரங்களின் வளர்ச்சி வளைவின் வடிவம்</a:t>
+            </a:r>
+            <a:r>
+              <a:rPr lang="en-US" sz="1600" dirty="0"/>
+              <a:t> </a:t>
+            </a:r>
+            <a:r>
+              <a:rPr lang="ta-IN" sz="1600" dirty="0"/>
+              <a:t>எப்படி இருக்கும்?</a:t>
             </a:r>
           </a:p>
           <a:p>
@@ -9667,7 +9675,7 @@
         <p:spPr>
           <a:xfrm>
             <a:off x="457200" y="1371600"/>
-            <a:ext cx="7315200" cy="1815882"/>
+            <a:ext cx="7315200" cy="2062103"/>
           </a:xfrm>
           <a:prstGeom prst="rect">
             <a:avLst/>
@@ -9759,19 +9767,16 @@
               <a:t> </a:t>
             </a:r>
             <a:r>
-              <a:rPr sz="1600" dirty="0" err="1">
+              <a:rPr lang="ta-IN" sz="1600" dirty="0">
                 <a:latin typeface="Latha" panose="020B0604020202020204" pitchFamily="34" charset="0"/>
                 <a:cs typeface="Latha" panose="020B0604020202020204" pitchFamily="34" charset="0"/>
               </a:rPr>
-              <a:t>என்ன</a:t>
-            </a:r>
-            <a:r>
-              <a:rPr sz="1600" dirty="0">
-                <a:latin typeface="Latha" panose="020B0604020202020204" pitchFamily="34" charset="0"/>
-                <a:cs typeface="Latha" panose="020B0604020202020204" pitchFamily="34" charset="0"/>
-              </a:rPr>
-              <a:t>?</a:t>
-            </a:r>
+              <a:t>எப்படி இருக்கும்?</a:t>
+            </a:r>
+            <a:endParaRPr sz="1600" dirty="0">
+              <a:latin typeface="Latha" panose="020B0604020202020204" pitchFamily="34" charset="0"/>
+              <a:cs typeface="Latha" panose="020B0604020202020204" pitchFamily="34" charset="0"/>
+            </a:endParaRPr>
           </a:p>
           <a:p>
             <a:endParaRPr dirty="0"/>
@@ -24377,8 +24382,8 @@
         </p:blipFill>
         <p:spPr>
           <a:xfrm>
-            <a:off x="3420253" y="2618954"/>
-            <a:ext cx="5037947" cy="2777574"/>
+            <a:off x="2963053" y="2712260"/>
+            <a:ext cx="4501437" cy="2481780"/>
           </a:xfrm>
           <a:prstGeom prst="rect">
             <a:avLst/>
@@ -24697,8 +24702,8 @@
         </p:blipFill>
         <p:spPr>
           <a:xfrm>
-            <a:off x="2571168" y="2677886"/>
-            <a:ext cx="5037947" cy="2777574"/>
+            <a:off x="2571169" y="2677886"/>
+            <a:ext cx="4380138" cy="2414904"/>
           </a:xfrm>
           <a:prstGeom prst="rect">
             <a:avLst/>

</xml_diff>